<commit_message>
Able to read ppt chart by visitor
</commit_message>
<xml_diff>
--- a/withChart.pptx
+++ b/withChart.pptx
@@ -7,6 +7,10 @@
   <p:sldIdLst>
     <p:sldId id="256" r:id="rId2"/>
     <p:sldId id="257" r:id="rId3"/>
+    <p:sldId id="258" r:id="rId4"/>
+    <p:sldId id="259" r:id="rId5"/>
+    <p:sldId id="260" r:id="rId6"/>
+    <p:sldId id="261" r:id="rId7"/>
   </p:sldIdLst>
   <p:sldSz cx="12192000" cy="6858000"/>
   <p:notesSz cx="6858000" cy="9144000"/>
@@ -139,40 +143,6 @@
   </mc:AlternateContent>
   <c:chart>
     <c:title>
-      <c:tx>
-        <c:rich>
-          <a:bodyPr rot="0" spcFirstLastPara="1" vertOverflow="ellipsis" vert="horz" wrap="square" anchor="ctr" anchorCtr="1"/>
-          <a:lstStyle/>
-          <a:p>
-            <a:pPr>
-              <a:defRPr sz="1862" b="0" i="0" u="none" strike="noStrike" kern="1200" spc="0" baseline="0">
-                <a:solidFill>
-                  <a:schemeClr val="tx1">
-                    <a:lumMod val="65000"/>
-                    <a:lumOff val="35000"/>
-                  </a:schemeClr>
-                </a:solidFill>
-                <a:latin typeface="+mn-lt"/>
-                <a:ea typeface="+mn-ea"/>
-                <a:cs typeface="+mn-cs"/>
-              </a:defRPr>
-            </a:pPr>
-            <a:r>
-              <a:rPr lang="ja-JP" altLang="en-US" dirty="0"/>
-              <a:t>これがタイトル</a:t>
-            </a:r>
-            <a:r>
-              <a:rPr lang="en-US" altLang="ja-JP" dirty="0"/>
-              <a:t>a123</a:t>
-            </a:r>
-            <a:r>
-              <a:rPr lang="ja-JP" altLang="en-US"/>
-              <a:t>です</a:t>
-            </a:r>
-            <a:endParaRPr lang="ja-JP" altLang="en-US" dirty="0"/>
-          </a:p>
-        </c:rich>
-      </c:tx>
       <c:overlay val="0"/>
       <c:spPr>
         <a:noFill/>
@@ -1079,6 +1049,1381 @@
 </c:chartSpace>
 </file>
 
+<file path=ppt/charts/chart3.xml><?xml version="1.0" encoding="utf-8"?>
+<c:chartSpace xmlns:c="http://schemas.openxmlformats.org/drawingml/2006/chart" xmlns:a="http://schemas.openxmlformats.org/drawingml/2006/main" xmlns:r="http://schemas.openxmlformats.org/officeDocument/2006/relationships" xmlns:c16r2="http://schemas.microsoft.com/office/drawing/2015/06/chart">
+  <c:date1904 val="0"/>
+  <c:lang val="ja-JP"/>
+  <c:roundedCorners val="0"/>
+  <mc:AlternateContent xmlns:mc="http://schemas.openxmlformats.org/markup-compatibility/2006">
+    <mc:Choice xmlns:c14="http://schemas.microsoft.com/office/drawing/2007/8/2/chart" Requires="c14">
+      <c14:style val="102"/>
+    </mc:Choice>
+    <mc:Fallback>
+      <c:style val="2"/>
+    </mc:Fallback>
+  </mc:AlternateContent>
+  <c:chart>
+    <c:title>
+      <c:overlay val="0"/>
+      <c:spPr>
+        <a:noFill/>
+        <a:ln>
+          <a:noFill/>
+        </a:ln>
+        <a:effectLst/>
+      </c:spPr>
+      <c:txPr>
+        <a:bodyPr rot="0" spcFirstLastPara="1" vertOverflow="ellipsis" vert="horz" wrap="square" anchor="ctr" anchorCtr="1"/>
+        <a:lstStyle/>
+        <a:p>
+          <a:pPr>
+            <a:defRPr sz="1862" b="0" i="0" u="none" strike="noStrike" kern="1200" spc="0" baseline="0">
+              <a:solidFill>
+                <a:schemeClr val="tx1">
+                  <a:lumMod val="65000"/>
+                  <a:lumOff val="35000"/>
+                </a:schemeClr>
+              </a:solidFill>
+              <a:latin typeface="+mn-lt"/>
+              <a:ea typeface="+mn-ea"/>
+              <a:cs typeface="+mn-cs"/>
+            </a:defRPr>
+          </a:pPr>
+          <a:endParaRPr lang="ja-JP"/>
+        </a:p>
+      </c:txPr>
+    </c:title>
+    <c:autoTitleDeleted val="0"/>
+    <c:plotArea>
+      <c:layout/>
+      <c:barChart>
+        <c:barDir val="bar"/>
+        <c:grouping val="clustered"/>
+        <c:varyColors val="0"/>
+        <c:ser>
+          <c:idx val="0"/>
+          <c:order val="0"/>
+          <c:tx>
+            <c:strRef>
+              <c:f>Sheet1!$B$1</c:f>
+              <c:strCache>
+                <c:ptCount val="1"/>
+                <c:pt idx="0">
+                  <c:v>系列 1</c:v>
+                </c:pt>
+              </c:strCache>
+            </c:strRef>
+          </c:tx>
+          <c:spPr>
+            <a:solidFill>
+              <a:schemeClr val="accent1"/>
+            </a:solidFill>
+            <a:ln>
+              <a:noFill/>
+            </a:ln>
+            <a:effectLst/>
+          </c:spPr>
+          <c:invertIfNegative val="0"/>
+          <c:cat>
+            <c:strRef>
+              <c:f>Sheet1!$A$2:$A$5</c:f>
+              <c:strCache>
+                <c:ptCount val="4"/>
+                <c:pt idx="0">
+                  <c:v>カテゴリ 1</c:v>
+                </c:pt>
+                <c:pt idx="1">
+                  <c:v>カテゴリ 2</c:v>
+                </c:pt>
+                <c:pt idx="2">
+                  <c:v>カテゴリ 3</c:v>
+                </c:pt>
+                <c:pt idx="3">
+                  <c:v>カテゴリ 4</c:v>
+                </c:pt>
+              </c:strCache>
+            </c:strRef>
+          </c:cat>
+          <c:val>
+            <c:numRef>
+              <c:f>Sheet1!$B$2:$B$5</c:f>
+              <c:numCache>
+                <c:formatCode>General</c:formatCode>
+                <c:ptCount val="4"/>
+                <c:pt idx="0">
+                  <c:v>4.3</c:v>
+                </c:pt>
+                <c:pt idx="1">
+                  <c:v>2.5</c:v>
+                </c:pt>
+                <c:pt idx="2">
+                  <c:v>3.5</c:v>
+                </c:pt>
+                <c:pt idx="3">
+                  <c:v>4.5</c:v>
+                </c:pt>
+              </c:numCache>
+            </c:numRef>
+          </c:val>
+          <c:extLst>
+            <c:ext xmlns:c16="http://schemas.microsoft.com/office/drawing/2014/chart" uri="{C3380CC4-5D6E-409C-BE32-E72D297353CC}">
+              <c16:uniqueId val="{00000000-ECD5-43E8-A09D-26EA6D90C9E6}"/>
+            </c:ext>
+          </c:extLst>
+        </c:ser>
+        <c:ser>
+          <c:idx val="1"/>
+          <c:order val="1"/>
+          <c:tx>
+            <c:strRef>
+              <c:f>Sheet1!$C$1</c:f>
+              <c:strCache>
+                <c:ptCount val="1"/>
+                <c:pt idx="0">
+                  <c:v>系列 2</c:v>
+                </c:pt>
+              </c:strCache>
+            </c:strRef>
+          </c:tx>
+          <c:spPr>
+            <a:solidFill>
+              <a:schemeClr val="accent2"/>
+            </a:solidFill>
+            <a:ln>
+              <a:noFill/>
+            </a:ln>
+            <a:effectLst/>
+          </c:spPr>
+          <c:invertIfNegative val="0"/>
+          <c:cat>
+            <c:strRef>
+              <c:f>Sheet1!$A$2:$A$5</c:f>
+              <c:strCache>
+                <c:ptCount val="4"/>
+                <c:pt idx="0">
+                  <c:v>カテゴリ 1</c:v>
+                </c:pt>
+                <c:pt idx="1">
+                  <c:v>カテゴリ 2</c:v>
+                </c:pt>
+                <c:pt idx="2">
+                  <c:v>カテゴリ 3</c:v>
+                </c:pt>
+                <c:pt idx="3">
+                  <c:v>カテゴリ 4</c:v>
+                </c:pt>
+              </c:strCache>
+            </c:strRef>
+          </c:cat>
+          <c:val>
+            <c:numRef>
+              <c:f>Sheet1!$C$2:$C$5</c:f>
+              <c:numCache>
+                <c:formatCode>General</c:formatCode>
+                <c:ptCount val="4"/>
+                <c:pt idx="0">
+                  <c:v>2.4</c:v>
+                </c:pt>
+                <c:pt idx="1">
+                  <c:v>4.4000000000000004</c:v>
+                </c:pt>
+                <c:pt idx="2">
+                  <c:v>1.8</c:v>
+                </c:pt>
+                <c:pt idx="3">
+                  <c:v>2.8</c:v>
+                </c:pt>
+              </c:numCache>
+            </c:numRef>
+          </c:val>
+          <c:extLst>
+            <c:ext xmlns:c16="http://schemas.microsoft.com/office/drawing/2014/chart" uri="{C3380CC4-5D6E-409C-BE32-E72D297353CC}">
+              <c16:uniqueId val="{00000001-ECD5-43E8-A09D-26EA6D90C9E6}"/>
+            </c:ext>
+          </c:extLst>
+        </c:ser>
+        <c:ser>
+          <c:idx val="2"/>
+          <c:order val="2"/>
+          <c:tx>
+            <c:strRef>
+              <c:f>Sheet1!$D$1</c:f>
+              <c:strCache>
+                <c:ptCount val="1"/>
+                <c:pt idx="0">
+                  <c:v>系列 3</c:v>
+                </c:pt>
+              </c:strCache>
+            </c:strRef>
+          </c:tx>
+          <c:spPr>
+            <a:solidFill>
+              <a:schemeClr val="accent3"/>
+            </a:solidFill>
+            <a:ln>
+              <a:noFill/>
+            </a:ln>
+            <a:effectLst/>
+          </c:spPr>
+          <c:invertIfNegative val="0"/>
+          <c:cat>
+            <c:strRef>
+              <c:f>Sheet1!$A$2:$A$5</c:f>
+              <c:strCache>
+                <c:ptCount val="4"/>
+                <c:pt idx="0">
+                  <c:v>カテゴリ 1</c:v>
+                </c:pt>
+                <c:pt idx="1">
+                  <c:v>カテゴリ 2</c:v>
+                </c:pt>
+                <c:pt idx="2">
+                  <c:v>カテゴリ 3</c:v>
+                </c:pt>
+                <c:pt idx="3">
+                  <c:v>カテゴリ 4</c:v>
+                </c:pt>
+              </c:strCache>
+            </c:strRef>
+          </c:cat>
+          <c:val>
+            <c:numRef>
+              <c:f>Sheet1!$D$2:$D$5</c:f>
+              <c:numCache>
+                <c:formatCode>General</c:formatCode>
+                <c:ptCount val="4"/>
+                <c:pt idx="0">
+                  <c:v>2</c:v>
+                </c:pt>
+                <c:pt idx="1">
+                  <c:v>2</c:v>
+                </c:pt>
+                <c:pt idx="2">
+                  <c:v>3</c:v>
+                </c:pt>
+                <c:pt idx="3">
+                  <c:v>5</c:v>
+                </c:pt>
+              </c:numCache>
+            </c:numRef>
+          </c:val>
+          <c:extLst>
+            <c:ext xmlns:c16="http://schemas.microsoft.com/office/drawing/2014/chart" uri="{C3380CC4-5D6E-409C-BE32-E72D297353CC}">
+              <c16:uniqueId val="{00000002-ECD5-43E8-A09D-26EA6D90C9E6}"/>
+            </c:ext>
+          </c:extLst>
+        </c:ser>
+        <c:dLbls>
+          <c:showLegendKey val="0"/>
+          <c:showVal val="0"/>
+          <c:showCatName val="0"/>
+          <c:showSerName val="0"/>
+          <c:showPercent val="0"/>
+          <c:showBubbleSize val="0"/>
+        </c:dLbls>
+        <c:gapWidth val="182"/>
+        <c:axId val="849535112"/>
+        <c:axId val="849541672"/>
+      </c:barChart>
+      <c:catAx>
+        <c:axId val="849535112"/>
+        <c:scaling>
+          <c:orientation val="minMax"/>
+        </c:scaling>
+        <c:delete val="0"/>
+        <c:axPos val="l"/>
+        <c:numFmt formatCode="General" sourceLinked="1"/>
+        <c:majorTickMark val="none"/>
+        <c:minorTickMark val="none"/>
+        <c:tickLblPos val="nextTo"/>
+        <c:spPr>
+          <a:noFill/>
+          <a:ln w="9525" cap="flat" cmpd="sng" algn="ctr">
+            <a:solidFill>
+              <a:schemeClr val="tx1">
+                <a:lumMod val="15000"/>
+                <a:lumOff val="85000"/>
+              </a:schemeClr>
+            </a:solidFill>
+            <a:round/>
+          </a:ln>
+          <a:effectLst/>
+        </c:spPr>
+        <c:txPr>
+          <a:bodyPr rot="-60000000" spcFirstLastPara="1" vertOverflow="ellipsis" vert="horz" wrap="square" anchor="ctr" anchorCtr="1"/>
+          <a:lstStyle/>
+          <a:p>
+            <a:pPr>
+              <a:defRPr sz="1197" b="0" i="0" u="none" strike="noStrike" kern="1200" baseline="0">
+                <a:solidFill>
+                  <a:schemeClr val="tx1">
+                    <a:lumMod val="65000"/>
+                    <a:lumOff val="35000"/>
+                  </a:schemeClr>
+                </a:solidFill>
+                <a:latin typeface="+mn-lt"/>
+                <a:ea typeface="+mn-ea"/>
+                <a:cs typeface="+mn-cs"/>
+              </a:defRPr>
+            </a:pPr>
+            <a:endParaRPr lang="ja-JP"/>
+          </a:p>
+        </c:txPr>
+        <c:crossAx val="849541672"/>
+        <c:crosses val="autoZero"/>
+        <c:auto val="1"/>
+        <c:lblAlgn val="ctr"/>
+        <c:lblOffset val="100"/>
+        <c:noMultiLvlLbl val="0"/>
+      </c:catAx>
+      <c:valAx>
+        <c:axId val="849541672"/>
+        <c:scaling>
+          <c:orientation val="minMax"/>
+        </c:scaling>
+        <c:delete val="0"/>
+        <c:axPos val="b"/>
+        <c:majorGridlines>
+          <c:spPr>
+            <a:ln w="9525" cap="flat" cmpd="sng" algn="ctr">
+              <a:solidFill>
+                <a:schemeClr val="tx1">
+                  <a:lumMod val="15000"/>
+                  <a:lumOff val="85000"/>
+                </a:schemeClr>
+              </a:solidFill>
+              <a:round/>
+            </a:ln>
+            <a:effectLst/>
+          </c:spPr>
+        </c:majorGridlines>
+        <c:numFmt formatCode="General" sourceLinked="1"/>
+        <c:majorTickMark val="none"/>
+        <c:minorTickMark val="none"/>
+        <c:tickLblPos val="nextTo"/>
+        <c:spPr>
+          <a:noFill/>
+          <a:ln>
+            <a:noFill/>
+          </a:ln>
+          <a:effectLst/>
+        </c:spPr>
+        <c:txPr>
+          <a:bodyPr rot="-60000000" spcFirstLastPara="1" vertOverflow="ellipsis" vert="horz" wrap="square" anchor="ctr" anchorCtr="1"/>
+          <a:lstStyle/>
+          <a:p>
+            <a:pPr>
+              <a:defRPr sz="1197" b="0" i="0" u="none" strike="noStrike" kern="1200" baseline="0">
+                <a:solidFill>
+                  <a:schemeClr val="tx1">
+                    <a:lumMod val="65000"/>
+                    <a:lumOff val="35000"/>
+                  </a:schemeClr>
+                </a:solidFill>
+                <a:latin typeface="+mn-lt"/>
+                <a:ea typeface="+mn-ea"/>
+                <a:cs typeface="+mn-cs"/>
+              </a:defRPr>
+            </a:pPr>
+            <a:endParaRPr lang="ja-JP"/>
+          </a:p>
+        </c:txPr>
+        <c:crossAx val="849535112"/>
+        <c:crosses val="autoZero"/>
+        <c:crossBetween val="between"/>
+      </c:valAx>
+      <c:spPr>
+        <a:noFill/>
+        <a:ln>
+          <a:noFill/>
+        </a:ln>
+        <a:effectLst/>
+      </c:spPr>
+    </c:plotArea>
+    <c:legend>
+      <c:legendPos val="b"/>
+      <c:overlay val="0"/>
+      <c:spPr>
+        <a:noFill/>
+        <a:ln>
+          <a:noFill/>
+        </a:ln>
+        <a:effectLst/>
+      </c:spPr>
+      <c:txPr>
+        <a:bodyPr rot="0" spcFirstLastPara="1" vertOverflow="ellipsis" vert="horz" wrap="square" anchor="ctr" anchorCtr="1"/>
+        <a:lstStyle/>
+        <a:p>
+          <a:pPr>
+            <a:defRPr sz="1197" b="0" i="0" u="none" strike="noStrike" kern="1200" baseline="0">
+              <a:solidFill>
+                <a:schemeClr val="tx1">
+                  <a:lumMod val="65000"/>
+                  <a:lumOff val="35000"/>
+                </a:schemeClr>
+              </a:solidFill>
+              <a:latin typeface="+mn-lt"/>
+              <a:ea typeface="+mn-ea"/>
+              <a:cs typeface="+mn-cs"/>
+            </a:defRPr>
+          </a:pPr>
+          <a:endParaRPr lang="ja-JP"/>
+        </a:p>
+      </c:txPr>
+    </c:legend>
+    <c:plotVisOnly val="1"/>
+    <c:dispBlanksAs val="gap"/>
+    <c:extLst>
+      <c:ext xmlns:c16r3="http://schemas.microsoft.com/office/drawing/2017/03/chart" uri="{56B9EC1D-385E-4148-901F-78D8002777C0}">
+        <c16r3:dataDisplayOptions16>
+          <c16r3:dispNaAsBlank val="1"/>
+        </c16r3:dataDisplayOptions16>
+      </c:ext>
+    </c:extLst>
+    <c:showDLblsOverMax val="0"/>
+  </c:chart>
+  <c:spPr>
+    <a:noFill/>
+    <a:ln>
+      <a:noFill/>
+    </a:ln>
+    <a:effectLst/>
+  </c:spPr>
+  <c:txPr>
+    <a:bodyPr/>
+    <a:lstStyle/>
+    <a:p>
+      <a:pPr>
+        <a:defRPr/>
+      </a:pPr>
+      <a:endParaRPr lang="ja-JP"/>
+    </a:p>
+  </c:txPr>
+  <c:externalData r:id="rId3">
+    <c:autoUpdate val="0"/>
+  </c:externalData>
+</c:chartSpace>
+</file>
+
+<file path=ppt/charts/chart4.xml><?xml version="1.0" encoding="utf-8"?>
+<c:chartSpace xmlns:c="http://schemas.openxmlformats.org/drawingml/2006/chart" xmlns:a="http://schemas.openxmlformats.org/drawingml/2006/main" xmlns:r="http://schemas.openxmlformats.org/officeDocument/2006/relationships" xmlns:c16r2="http://schemas.microsoft.com/office/drawing/2015/06/chart">
+  <c:date1904 val="0"/>
+  <c:lang val="ja-JP"/>
+  <c:roundedCorners val="0"/>
+  <mc:AlternateContent xmlns:mc="http://schemas.openxmlformats.org/markup-compatibility/2006">
+    <mc:Choice xmlns:c14="http://schemas.microsoft.com/office/drawing/2007/8/2/chart" Requires="c14">
+      <c14:style val="102"/>
+    </mc:Choice>
+    <mc:Fallback>
+      <c:style val="2"/>
+    </mc:Fallback>
+  </mc:AlternateContent>
+  <c:chart>
+    <c:title>
+      <c:overlay val="0"/>
+      <c:spPr>
+        <a:noFill/>
+        <a:ln>
+          <a:noFill/>
+        </a:ln>
+        <a:effectLst/>
+      </c:spPr>
+      <c:txPr>
+        <a:bodyPr rot="0" spcFirstLastPara="1" vertOverflow="ellipsis" vert="horz" wrap="square" anchor="ctr" anchorCtr="1"/>
+        <a:lstStyle/>
+        <a:p>
+          <a:pPr>
+            <a:defRPr sz="1862" b="0" i="0" u="none" strike="noStrike" kern="1200" spc="0" baseline="0">
+              <a:solidFill>
+                <a:schemeClr val="tx1">
+                  <a:lumMod val="65000"/>
+                  <a:lumOff val="35000"/>
+                </a:schemeClr>
+              </a:solidFill>
+              <a:latin typeface="+mn-lt"/>
+              <a:ea typeface="+mn-ea"/>
+              <a:cs typeface="+mn-cs"/>
+            </a:defRPr>
+          </a:pPr>
+          <a:endParaRPr lang="ja-JP"/>
+        </a:p>
+      </c:txPr>
+    </c:title>
+    <c:autoTitleDeleted val="0"/>
+    <c:view3D>
+      <c:rotX val="15"/>
+      <c:rotY val="20"/>
+      <c:rAngAx val="0"/>
+    </c:view3D>
+    <c:floor>
+      <c:thickness val="0"/>
+      <c:spPr>
+        <a:noFill/>
+        <a:ln>
+          <a:noFill/>
+        </a:ln>
+        <a:effectLst/>
+        <a:sp3d/>
+      </c:spPr>
+    </c:floor>
+    <c:sideWall>
+      <c:thickness val="0"/>
+      <c:spPr>
+        <a:noFill/>
+        <a:ln>
+          <a:noFill/>
+        </a:ln>
+        <a:effectLst/>
+        <a:sp3d/>
+      </c:spPr>
+    </c:sideWall>
+    <c:backWall>
+      <c:thickness val="0"/>
+      <c:spPr>
+        <a:noFill/>
+        <a:ln>
+          <a:noFill/>
+        </a:ln>
+        <a:effectLst/>
+        <a:sp3d/>
+      </c:spPr>
+    </c:backWall>
+    <c:plotArea>
+      <c:layout/>
+      <c:surface3DChart>
+        <c:wireframe val="0"/>
+        <c:ser>
+          <c:idx val="0"/>
+          <c:order val="0"/>
+          <c:tx>
+            <c:strRef>
+              <c:f>Sheet1!$B$1</c:f>
+              <c:strCache>
+                <c:ptCount val="1"/>
+                <c:pt idx="0">
+                  <c:v>系列 1</c:v>
+                </c:pt>
+              </c:strCache>
+            </c:strRef>
+          </c:tx>
+          <c:spPr>
+            <a:solidFill>
+              <a:schemeClr val="accent1"/>
+            </a:solidFill>
+            <a:ln/>
+            <a:effectLst/>
+            <a:sp3d/>
+          </c:spPr>
+          <c:cat>
+            <c:strRef>
+              <c:f>Sheet1!$A$2:$A$5</c:f>
+              <c:strCache>
+                <c:ptCount val="4"/>
+                <c:pt idx="0">
+                  <c:v>カテゴリ 1</c:v>
+                </c:pt>
+                <c:pt idx="1">
+                  <c:v>カテゴリ 2</c:v>
+                </c:pt>
+                <c:pt idx="2">
+                  <c:v>カテゴリ 3</c:v>
+                </c:pt>
+                <c:pt idx="3">
+                  <c:v>カテゴリ 4</c:v>
+                </c:pt>
+              </c:strCache>
+            </c:strRef>
+          </c:cat>
+          <c:val>
+            <c:numRef>
+              <c:f>Sheet1!$B$2:$B$5</c:f>
+              <c:numCache>
+                <c:formatCode>General</c:formatCode>
+                <c:ptCount val="4"/>
+                <c:pt idx="0">
+                  <c:v>4.3</c:v>
+                </c:pt>
+                <c:pt idx="1">
+                  <c:v>2.5</c:v>
+                </c:pt>
+                <c:pt idx="2">
+                  <c:v>3.5</c:v>
+                </c:pt>
+                <c:pt idx="3">
+                  <c:v>4.5</c:v>
+                </c:pt>
+              </c:numCache>
+            </c:numRef>
+          </c:val>
+          <c:extLst>
+            <c:ext xmlns:c16="http://schemas.microsoft.com/office/drawing/2014/chart" uri="{C3380CC4-5D6E-409C-BE32-E72D297353CC}">
+              <c16:uniqueId val="{00000000-A00F-4B8A-B0D6-E65E1D92D1CD}"/>
+            </c:ext>
+          </c:extLst>
+        </c:ser>
+        <c:ser>
+          <c:idx val="1"/>
+          <c:order val="1"/>
+          <c:tx>
+            <c:strRef>
+              <c:f>Sheet1!$C$1</c:f>
+              <c:strCache>
+                <c:ptCount val="1"/>
+                <c:pt idx="0">
+                  <c:v>系列 2</c:v>
+                </c:pt>
+              </c:strCache>
+            </c:strRef>
+          </c:tx>
+          <c:spPr>
+            <a:solidFill>
+              <a:schemeClr val="accent2"/>
+            </a:solidFill>
+            <a:ln/>
+            <a:effectLst/>
+            <a:sp3d/>
+          </c:spPr>
+          <c:cat>
+            <c:strRef>
+              <c:f>Sheet1!$A$2:$A$5</c:f>
+              <c:strCache>
+                <c:ptCount val="4"/>
+                <c:pt idx="0">
+                  <c:v>カテゴリ 1</c:v>
+                </c:pt>
+                <c:pt idx="1">
+                  <c:v>カテゴリ 2</c:v>
+                </c:pt>
+                <c:pt idx="2">
+                  <c:v>カテゴリ 3</c:v>
+                </c:pt>
+                <c:pt idx="3">
+                  <c:v>カテゴリ 4</c:v>
+                </c:pt>
+              </c:strCache>
+            </c:strRef>
+          </c:cat>
+          <c:val>
+            <c:numRef>
+              <c:f>Sheet1!$C$2:$C$5</c:f>
+              <c:numCache>
+                <c:formatCode>General</c:formatCode>
+                <c:ptCount val="4"/>
+                <c:pt idx="0">
+                  <c:v>2.4</c:v>
+                </c:pt>
+                <c:pt idx="1">
+                  <c:v>4.4000000000000004</c:v>
+                </c:pt>
+                <c:pt idx="2">
+                  <c:v>1.8</c:v>
+                </c:pt>
+                <c:pt idx="3">
+                  <c:v>2.8</c:v>
+                </c:pt>
+              </c:numCache>
+            </c:numRef>
+          </c:val>
+          <c:extLst>
+            <c:ext xmlns:c16="http://schemas.microsoft.com/office/drawing/2014/chart" uri="{C3380CC4-5D6E-409C-BE32-E72D297353CC}">
+              <c16:uniqueId val="{00000001-A00F-4B8A-B0D6-E65E1D92D1CD}"/>
+            </c:ext>
+          </c:extLst>
+        </c:ser>
+        <c:ser>
+          <c:idx val="2"/>
+          <c:order val="2"/>
+          <c:tx>
+            <c:strRef>
+              <c:f>Sheet1!$D$1</c:f>
+              <c:strCache>
+                <c:ptCount val="1"/>
+                <c:pt idx="0">
+                  <c:v>系列 3</c:v>
+                </c:pt>
+              </c:strCache>
+            </c:strRef>
+          </c:tx>
+          <c:spPr>
+            <a:solidFill>
+              <a:schemeClr val="accent3"/>
+            </a:solidFill>
+            <a:ln/>
+            <a:effectLst/>
+            <a:sp3d/>
+          </c:spPr>
+          <c:cat>
+            <c:strRef>
+              <c:f>Sheet1!$A$2:$A$5</c:f>
+              <c:strCache>
+                <c:ptCount val="4"/>
+                <c:pt idx="0">
+                  <c:v>カテゴリ 1</c:v>
+                </c:pt>
+                <c:pt idx="1">
+                  <c:v>カテゴリ 2</c:v>
+                </c:pt>
+                <c:pt idx="2">
+                  <c:v>カテゴリ 3</c:v>
+                </c:pt>
+                <c:pt idx="3">
+                  <c:v>カテゴリ 4</c:v>
+                </c:pt>
+              </c:strCache>
+            </c:strRef>
+          </c:cat>
+          <c:val>
+            <c:numRef>
+              <c:f>Sheet1!$D$2:$D$5</c:f>
+              <c:numCache>
+                <c:formatCode>General</c:formatCode>
+                <c:ptCount val="4"/>
+                <c:pt idx="0">
+                  <c:v>2</c:v>
+                </c:pt>
+                <c:pt idx="1">
+                  <c:v>2</c:v>
+                </c:pt>
+                <c:pt idx="2">
+                  <c:v>3</c:v>
+                </c:pt>
+                <c:pt idx="3">
+                  <c:v>5</c:v>
+                </c:pt>
+              </c:numCache>
+            </c:numRef>
+          </c:val>
+          <c:extLst>
+            <c:ext xmlns:c16="http://schemas.microsoft.com/office/drawing/2014/chart" uri="{C3380CC4-5D6E-409C-BE32-E72D297353CC}">
+              <c16:uniqueId val="{00000002-A00F-4B8A-B0D6-E65E1D92D1CD}"/>
+            </c:ext>
+          </c:extLst>
+        </c:ser>
+        <c:bandFmts>
+          <c:bandFmt>
+            <c:idx val="0"/>
+            <c:spPr>
+              <a:solidFill>
+                <a:schemeClr val="accent1"/>
+              </a:solidFill>
+              <a:ln/>
+              <a:effectLst/>
+              <a:sp3d/>
+            </c:spPr>
+          </c:bandFmt>
+          <c:bandFmt>
+            <c:idx val="1"/>
+            <c:spPr>
+              <a:solidFill>
+                <a:schemeClr val="accent2"/>
+              </a:solidFill>
+              <a:ln/>
+              <a:effectLst/>
+              <a:sp3d/>
+            </c:spPr>
+          </c:bandFmt>
+          <c:bandFmt>
+            <c:idx val="2"/>
+            <c:spPr>
+              <a:solidFill>
+                <a:schemeClr val="accent3"/>
+              </a:solidFill>
+              <a:ln/>
+              <a:effectLst/>
+              <a:sp3d/>
+            </c:spPr>
+          </c:bandFmt>
+          <c:bandFmt>
+            <c:idx val="3"/>
+            <c:spPr>
+              <a:solidFill>
+                <a:schemeClr val="accent4"/>
+              </a:solidFill>
+              <a:ln/>
+              <a:effectLst/>
+              <a:sp3d/>
+            </c:spPr>
+          </c:bandFmt>
+          <c:bandFmt>
+            <c:idx val="4"/>
+            <c:spPr>
+              <a:solidFill>
+                <a:schemeClr val="accent5"/>
+              </a:solidFill>
+              <a:ln/>
+              <a:effectLst/>
+              <a:sp3d/>
+            </c:spPr>
+          </c:bandFmt>
+          <c:bandFmt>
+            <c:idx val="5"/>
+            <c:spPr>
+              <a:solidFill>
+                <a:schemeClr val="accent6"/>
+              </a:solidFill>
+              <a:ln/>
+              <a:effectLst/>
+              <a:sp3d/>
+            </c:spPr>
+          </c:bandFmt>
+          <c:bandFmt>
+            <c:idx val="6"/>
+            <c:spPr>
+              <a:solidFill>
+                <a:schemeClr val="accent1">
+                  <a:lumMod val="60000"/>
+                </a:schemeClr>
+              </a:solidFill>
+              <a:ln/>
+              <a:effectLst/>
+              <a:sp3d/>
+            </c:spPr>
+          </c:bandFmt>
+          <c:bandFmt>
+            <c:idx val="7"/>
+            <c:spPr>
+              <a:solidFill>
+                <a:schemeClr val="accent2">
+                  <a:lumMod val="60000"/>
+                </a:schemeClr>
+              </a:solidFill>
+              <a:ln/>
+              <a:effectLst/>
+              <a:sp3d/>
+            </c:spPr>
+          </c:bandFmt>
+          <c:bandFmt>
+            <c:idx val="8"/>
+            <c:spPr>
+              <a:solidFill>
+                <a:schemeClr val="accent3">
+                  <a:lumMod val="60000"/>
+                </a:schemeClr>
+              </a:solidFill>
+              <a:ln/>
+              <a:effectLst/>
+              <a:sp3d/>
+            </c:spPr>
+          </c:bandFmt>
+          <c:bandFmt>
+            <c:idx val="9"/>
+            <c:spPr>
+              <a:solidFill>
+                <a:schemeClr val="accent4">
+                  <a:lumMod val="60000"/>
+                </a:schemeClr>
+              </a:solidFill>
+              <a:ln/>
+              <a:effectLst/>
+              <a:sp3d/>
+            </c:spPr>
+          </c:bandFmt>
+          <c:bandFmt>
+            <c:idx val="10"/>
+            <c:spPr>
+              <a:solidFill>
+                <a:schemeClr val="accent5">
+                  <a:lumMod val="60000"/>
+                </a:schemeClr>
+              </a:solidFill>
+              <a:ln/>
+              <a:effectLst/>
+              <a:sp3d/>
+            </c:spPr>
+          </c:bandFmt>
+          <c:bandFmt>
+            <c:idx val="11"/>
+            <c:spPr>
+              <a:solidFill>
+                <a:schemeClr val="accent6">
+                  <a:lumMod val="60000"/>
+                </a:schemeClr>
+              </a:solidFill>
+              <a:ln/>
+              <a:effectLst/>
+              <a:sp3d/>
+            </c:spPr>
+          </c:bandFmt>
+          <c:bandFmt>
+            <c:idx val="12"/>
+            <c:spPr>
+              <a:solidFill>
+                <a:schemeClr val="accent1">
+                  <a:lumMod val="80000"/>
+                  <a:lumOff val="20000"/>
+                </a:schemeClr>
+              </a:solidFill>
+              <a:ln/>
+              <a:effectLst/>
+              <a:sp3d/>
+            </c:spPr>
+          </c:bandFmt>
+          <c:bandFmt>
+            <c:idx val="13"/>
+            <c:spPr>
+              <a:solidFill>
+                <a:schemeClr val="accent2">
+                  <a:lumMod val="80000"/>
+                  <a:lumOff val="20000"/>
+                </a:schemeClr>
+              </a:solidFill>
+              <a:ln/>
+              <a:effectLst/>
+              <a:sp3d/>
+            </c:spPr>
+          </c:bandFmt>
+          <c:bandFmt>
+            <c:idx val="14"/>
+            <c:spPr>
+              <a:solidFill>
+                <a:schemeClr val="accent3">
+                  <a:lumMod val="80000"/>
+                  <a:lumOff val="20000"/>
+                </a:schemeClr>
+              </a:solidFill>
+              <a:ln/>
+              <a:effectLst/>
+              <a:sp3d/>
+            </c:spPr>
+          </c:bandFmt>
+        </c:bandFmts>
+        <c:axId val="759089184"/>
+        <c:axId val="759091152"/>
+        <c:axId val="679180944"/>
+      </c:surface3DChart>
+      <c:catAx>
+        <c:axId val="759089184"/>
+        <c:scaling>
+          <c:orientation val="minMax"/>
+        </c:scaling>
+        <c:delete val="0"/>
+        <c:axPos val="b"/>
+        <c:numFmt formatCode="General" sourceLinked="1"/>
+        <c:majorTickMark val="out"/>
+        <c:minorTickMark val="none"/>
+        <c:tickLblPos val="nextTo"/>
+        <c:spPr>
+          <a:noFill/>
+          <a:ln w="9525" cap="flat" cmpd="sng" algn="ctr">
+            <a:solidFill>
+              <a:schemeClr val="tx1">
+                <a:lumMod val="15000"/>
+                <a:lumOff val="85000"/>
+              </a:schemeClr>
+            </a:solidFill>
+            <a:round/>
+          </a:ln>
+          <a:effectLst/>
+        </c:spPr>
+        <c:txPr>
+          <a:bodyPr rot="-60000000" spcFirstLastPara="1" vertOverflow="ellipsis" vert="horz" wrap="square" anchor="ctr" anchorCtr="1"/>
+          <a:lstStyle/>
+          <a:p>
+            <a:pPr>
+              <a:defRPr sz="1197" b="0" i="0" u="none" strike="noStrike" kern="1200" baseline="0">
+                <a:solidFill>
+                  <a:schemeClr val="tx1">
+                    <a:lumMod val="65000"/>
+                    <a:lumOff val="35000"/>
+                  </a:schemeClr>
+                </a:solidFill>
+                <a:latin typeface="+mn-lt"/>
+                <a:ea typeface="+mn-ea"/>
+                <a:cs typeface="+mn-cs"/>
+              </a:defRPr>
+            </a:pPr>
+            <a:endParaRPr lang="ja-JP"/>
+          </a:p>
+        </c:txPr>
+        <c:crossAx val="759091152"/>
+        <c:crosses val="autoZero"/>
+        <c:auto val="1"/>
+        <c:lblAlgn val="ctr"/>
+        <c:lblOffset val="100"/>
+        <c:noMultiLvlLbl val="0"/>
+      </c:catAx>
+      <c:valAx>
+        <c:axId val="759091152"/>
+        <c:scaling>
+          <c:orientation val="minMax"/>
+        </c:scaling>
+        <c:delete val="0"/>
+        <c:axPos val="l"/>
+        <c:majorGridlines>
+          <c:spPr>
+            <a:ln w="9525" cap="flat" cmpd="sng" algn="ctr">
+              <a:solidFill>
+                <a:schemeClr val="tx1">
+                  <a:lumMod val="15000"/>
+                  <a:lumOff val="85000"/>
+                </a:schemeClr>
+              </a:solidFill>
+              <a:round/>
+            </a:ln>
+            <a:effectLst/>
+          </c:spPr>
+        </c:majorGridlines>
+        <c:numFmt formatCode="General" sourceLinked="1"/>
+        <c:majorTickMark val="none"/>
+        <c:minorTickMark val="none"/>
+        <c:tickLblPos val="nextTo"/>
+        <c:spPr>
+          <a:noFill/>
+          <a:ln>
+            <a:noFill/>
+          </a:ln>
+          <a:effectLst/>
+        </c:spPr>
+        <c:txPr>
+          <a:bodyPr rot="-60000000" spcFirstLastPara="1" vertOverflow="ellipsis" vert="horz" wrap="square" anchor="ctr" anchorCtr="1"/>
+          <a:lstStyle/>
+          <a:p>
+            <a:pPr>
+              <a:defRPr sz="1197" b="0" i="0" u="none" strike="noStrike" kern="1200" baseline="0">
+                <a:solidFill>
+                  <a:schemeClr val="tx1">
+                    <a:lumMod val="65000"/>
+                    <a:lumOff val="35000"/>
+                  </a:schemeClr>
+                </a:solidFill>
+                <a:latin typeface="+mn-lt"/>
+                <a:ea typeface="+mn-ea"/>
+                <a:cs typeface="+mn-cs"/>
+              </a:defRPr>
+            </a:pPr>
+            <a:endParaRPr lang="ja-JP"/>
+          </a:p>
+        </c:txPr>
+        <c:crossAx val="759089184"/>
+        <c:crosses val="autoZero"/>
+        <c:crossBetween val="midCat"/>
+      </c:valAx>
+      <c:serAx>
+        <c:axId val="679180944"/>
+        <c:scaling>
+          <c:orientation val="minMax"/>
+        </c:scaling>
+        <c:delete val="0"/>
+        <c:axPos val="b"/>
+        <c:majorTickMark val="out"/>
+        <c:minorTickMark val="none"/>
+        <c:tickLblPos val="nextTo"/>
+        <c:spPr>
+          <a:noFill/>
+          <a:ln w="9525" cap="flat" cmpd="sng" algn="ctr">
+            <a:solidFill>
+              <a:schemeClr val="tx1">
+                <a:lumMod val="15000"/>
+                <a:lumOff val="85000"/>
+              </a:schemeClr>
+            </a:solidFill>
+            <a:round/>
+          </a:ln>
+          <a:effectLst/>
+        </c:spPr>
+        <c:txPr>
+          <a:bodyPr rot="-60000000" spcFirstLastPara="1" vertOverflow="ellipsis" vert="horz" wrap="square" anchor="ctr" anchorCtr="1"/>
+          <a:lstStyle/>
+          <a:p>
+            <a:pPr>
+              <a:defRPr sz="1197" b="0" i="0" u="none" strike="noStrike" kern="1200" baseline="0">
+                <a:solidFill>
+                  <a:schemeClr val="tx1">
+                    <a:lumMod val="65000"/>
+                    <a:lumOff val="35000"/>
+                  </a:schemeClr>
+                </a:solidFill>
+                <a:latin typeface="+mn-lt"/>
+                <a:ea typeface="+mn-ea"/>
+                <a:cs typeface="+mn-cs"/>
+              </a:defRPr>
+            </a:pPr>
+            <a:endParaRPr lang="ja-JP"/>
+          </a:p>
+        </c:txPr>
+        <c:crossAx val="759091152"/>
+        <c:crosses val="autoZero"/>
+      </c:serAx>
+      <c:spPr>
+        <a:noFill/>
+        <a:ln>
+          <a:noFill/>
+        </a:ln>
+        <a:effectLst/>
+      </c:spPr>
+    </c:plotArea>
+    <c:legend>
+      <c:legendPos val="b"/>
+      <c:overlay val="0"/>
+      <c:spPr>
+        <a:noFill/>
+        <a:ln>
+          <a:noFill/>
+        </a:ln>
+        <a:effectLst/>
+      </c:spPr>
+      <c:txPr>
+        <a:bodyPr rot="0" spcFirstLastPara="1" vertOverflow="ellipsis" vert="horz" wrap="square" anchor="ctr" anchorCtr="1"/>
+        <a:lstStyle/>
+        <a:p>
+          <a:pPr rtl="0">
+            <a:defRPr sz="1197" b="0" i="0" u="none" strike="noStrike" kern="1200" baseline="0">
+              <a:solidFill>
+                <a:schemeClr val="tx1">
+                  <a:lumMod val="65000"/>
+                  <a:lumOff val="35000"/>
+                </a:schemeClr>
+              </a:solidFill>
+              <a:latin typeface="+mn-lt"/>
+              <a:ea typeface="+mn-ea"/>
+              <a:cs typeface="+mn-cs"/>
+            </a:defRPr>
+          </a:pPr>
+          <a:endParaRPr lang="ja-JP"/>
+        </a:p>
+      </c:txPr>
+    </c:legend>
+    <c:plotVisOnly val="1"/>
+    <c:dispBlanksAs val="zero"/>
+    <c:extLst>
+      <c:ext xmlns:c16r3="http://schemas.microsoft.com/office/drawing/2017/03/chart" uri="{56B9EC1D-385E-4148-901F-78D8002777C0}">
+        <c16r3:dataDisplayOptions16>
+          <c16r3:dispNaAsBlank val="1"/>
+        </c16r3:dataDisplayOptions16>
+      </c:ext>
+    </c:extLst>
+    <c:showDLblsOverMax val="0"/>
+  </c:chart>
+  <c:spPr>
+    <a:noFill/>
+    <a:ln>
+      <a:noFill/>
+    </a:ln>
+    <a:effectLst/>
+  </c:spPr>
+  <c:txPr>
+    <a:bodyPr/>
+    <a:lstStyle/>
+    <a:p>
+      <a:pPr>
+        <a:defRPr/>
+      </a:pPr>
+      <a:endParaRPr lang="ja-JP"/>
+    </a:p>
+  </c:txPr>
+  <c:externalData r:id="rId1">
+    <c:autoUpdate val="0"/>
+  </c:externalData>
+</c:chartSpace>
+</file>
+
+<file path=ppt/charts/chartEx1.xml><?xml version="1.0" encoding="utf-8"?>
+<cx:chartSpace xmlns:a="http://schemas.openxmlformats.org/drawingml/2006/main" xmlns:r="http://schemas.openxmlformats.org/officeDocument/2006/relationships" xmlns:cx="http://schemas.microsoft.com/office/drawing/2014/chartex">
+  <cx:chartData>
+    <cx:externalData r:id="rId1" cx:autoUpdate="0"/>
+    <cx:data id="0">
+      <cx:numDim type="val">
+        <cx:f>Sheet1!$A$2:$A$77</cx:f>
+        <cx:lvl ptCount="76" formatCode="G/標準">
+          <cx:pt idx="0">1</cx:pt>
+          <cx:pt idx="1">3</cx:pt>
+          <cx:pt idx="2">3</cx:pt>
+          <cx:pt idx="3">3</cx:pt>
+          <cx:pt idx="4">5</cx:pt>
+          <cx:pt idx="5">6</cx:pt>
+          <cx:pt idx="6">6</cx:pt>
+          <cx:pt idx="7">6</cx:pt>
+          <cx:pt idx="8">7</cx:pt>
+          <cx:pt idx="9">8</cx:pt>
+          <cx:pt idx="10">8</cx:pt>
+          <cx:pt idx="11">9</cx:pt>
+          <cx:pt idx="12">9</cx:pt>
+          <cx:pt idx="13">9</cx:pt>
+          <cx:pt idx="14">9</cx:pt>
+          <cx:pt idx="15">9</cx:pt>
+          <cx:pt idx="16">10</cx:pt>
+          <cx:pt idx="17">10</cx:pt>
+          <cx:pt idx="18">10</cx:pt>
+          <cx:pt idx="19">10</cx:pt>
+          <cx:pt idx="20">10</cx:pt>
+          <cx:pt idx="21">10</cx:pt>
+          <cx:pt idx="22">11</cx:pt>
+          <cx:pt idx="23">11</cx:pt>
+          <cx:pt idx="24">11</cx:pt>
+          <cx:pt idx="25">11</cx:pt>
+          <cx:pt idx="26">11</cx:pt>
+          <cx:pt idx="27">11</cx:pt>
+          <cx:pt idx="28">12</cx:pt>
+          <cx:pt idx="29">12</cx:pt>
+          <cx:pt idx="30">12</cx:pt>
+          <cx:pt idx="31">12</cx:pt>
+          <cx:pt idx="32">12</cx:pt>
+          <cx:pt idx="33">12</cx:pt>
+          <cx:pt idx="34">13</cx:pt>
+          <cx:pt idx="35">13</cx:pt>
+          <cx:pt idx="36">13</cx:pt>
+          <cx:pt idx="37">13</cx:pt>
+          <cx:pt idx="38">13</cx:pt>
+          <cx:pt idx="39">14</cx:pt>
+          <cx:pt idx="40">14</cx:pt>
+          <cx:pt idx="41">14</cx:pt>
+          <cx:pt idx="42">14</cx:pt>
+          <cx:pt idx="43">14</cx:pt>
+          <cx:pt idx="44">14</cx:pt>
+          <cx:pt idx="45">15</cx:pt>
+          <cx:pt idx="46">15</cx:pt>
+          <cx:pt idx="47">15</cx:pt>
+          <cx:pt idx="48">15</cx:pt>
+          <cx:pt idx="49">15</cx:pt>
+          <cx:pt idx="50">15</cx:pt>
+          <cx:pt idx="51">15</cx:pt>
+          <cx:pt idx="52">15</cx:pt>
+          <cx:pt idx="53">16</cx:pt>
+          <cx:pt idx="54">16</cx:pt>
+          <cx:pt idx="55">16</cx:pt>
+          <cx:pt idx="56">16</cx:pt>
+          <cx:pt idx="57">17</cx:pt>
+          <cx:pt idx="58">17</cx:pt>
+          <cx:pt idx="59">17</cx:pt>
+          <cx:pt idx="60">17</cx:pt>
+          <cx:pt idx="61">17</cx:pt>
+          <cx:pt idx="62">17</cx:pt>
+          <cx:pt idx="63">18</cx:pt>
+          <cx:pt idx="64">18</cx:pt>
+          <cx:pt idx="65">18</cx:pt>
+          <cx:pt idx="66">18</cx:pt>
+          <cx:pt idx="67">19</cx:pt>
+          <cx:pt idx="68">19</cx:pt>
+          <cx:pt idx="69">19</cx:pt>
+          <cx:pt idx="70">20</cx:pt>
+          <cx:pt idx="71">21</cx:pt>
+          <cx:pt idx="72">22</cx:pt>
+          <cx:pt idx="73">22</cx:pt>
+          <cx:pt idx="74">24</cx:pt>
+          <cx:pt idx="75">24</cx:pt>
+        </cx:lvl>
+      </cx:numDim>
+    </cx:data>
+  </cx:chartData>
+  <cx:chart>
+    <cx:title pos="t" align="ctr" overlay="0">
+      <cx:tx>
+        <cx:rich>
+          <a:bodyPr spcFirstLastPara="1" vertOverflow="ellipsis" horzOverflow="overflow" wrap="square" lIns="0" tIns="0" rIns="0" bIns="0" anchor="ctr" anchorCtr="1"/>
+          <a:lstStyle/>
+          <a:p>
+            <a:pPr algn="ctr" rtl="0">
+              <a:defRPr/>
+            </a:pPr>
+            <a:r>
+              <a:rPr lang="en-US" altLang="zh-CN" sz="1862" b="0" i="0" u="none" strike="noStrike" baseline="0" dirty="0" err="1">
+                <a:solidFill>
+                  <a:prstClr val="black">
+                    <a:lumMod val="65000"/>
+                    <a:lumOff val="35000"/>
+                  </a:prstClr>
+                </a:solidFill>
+                <a:latin typeface="游ゴシック" panose="020F0502020204030204"/>
+                <a:ea typeface="游ゴシック" panose="020B0400000000000000" pitchFamily="50" charset="-128"/>
+              </a:rPr>
+              <a:t>hisutoguramu</a:t>
+            </a:r>
+            <a:endParaRPr lang="ja-JP" altLang="en-US" sz="1862" b="0" i="0" u="none" strike="noStrike" baseline="0" dirty="0">
+              <a:solidFill>
+                <a:prstClr val="black">
+                  <a:lumMod val="65000"/>
+                  <a:lumOff val="35000"/>
+                </a:prstClr>
+              </a:solidFill>
+              <a:latin typeface="游ゴシック" panose="020F0502020204030204"/>
+              <a:ea typeface="游ゴシック" panose="020B0400000000000000" pitchFamily="50" charset="-128"/>
+            </a:endParaRPr>
+          </a:p>
+        </cx:rich>
+      </cx:tx>
+    </cx:title>
+    <cx:plotArea>
+      <cx:plotAreaRegion>
+        <cx:series layoutId="clusteredColumn" uniqueId="{145580FF-BCAE-441D-8F3B-29684ED77B2A}">
+          <cx:tx>
+            <cx:txData>
+              <cx:f>Sheet1!$A$1</cx:f>
+              <cx:v>系列1</cx:v>
+            </cx:txData>
+          </cx:tx>
+          <cx:dataId val="0"/>
+          <cx:layoutPr>
+            <cx:binning intervalClosed="r"/>
+          </cx:layoutPr>
+        </cx:series>
+      </cx:plotAreaRegion>
+      <cx:axis id="0">
+        <cx:catScaling gapWidth="0"/>
+        <cx:tickLabels/>
+      </cx:axis>
+      <cx:axis id="1">
+        <cx:valScaling/>
+        <cx:majorGridlines/>
+        <cx:tickLabels/>
+      </cx:axis>
+    </cx:plotArea>
+  </cx:chart>
+</cx:chartSpace>
+</file>
+
+<file path=ppt/charts/chartEx2.xml><?xml version="1.0" encoding="utf-8"?>
+<cx:chartSpace xmlns:a="http://schemas.openxmlformats.org/drawingml/2006/main" xmlns:r="http://schemas.openxmlformats.org/officeDocument/2006/relationships" xmlns:cx="http://schemas.microsoft.com/office/drawing/2014/chartex">
+  <cx:chartData>
+    <cx:externalData r:id="rId1" cx:autoUpdate="0"/>
+    <cx:data id="0">
+      <cx:strDim type="cat">
+        <cx:f>Sheet1!$A$2:$A$6</cx:f>
+        <cx:lvl ptCount="5">
+          <cx:pt idx="0">カテゴリ 1</cx:pt>
+          <cx:pt idx="1">カテゴリ 2</cx:pt>
+          <cx:pt idx="2">カテゴリ 3</cx:pt>
+          <cx:pt idx="3">カテゴリ 4</cx:pt>
+          <cx:pt idx="4">カテゴリ 5</cx:pt>
+        </cx:lvl>
+      </cx:strDim>
+      <cx:numDim type="val">
+        <cx:f>Sheet1!$B$2:$B$6</cx:f>
+        <cx:lvl ptCount="5" formatCode="G/標準">
+          <cx:pt idx="0">5000</cx:pt>
+          <cx:pt idx="1">4000</cx:pt>
+          <cx:pt idx="2">3000</cx:pt>
+          <cx:pt idx="3">1000</cx:pt>
+          <cx:pt idx="4">250</cx:pt>
+        </cx:lvl>
+      </cx:numDim>
+    </cx:data>
+  </cx:chartData>
+  <cx:chart>
+    <cx:title pos="t" align="ctr" overlay="0"/>
+    <cx:plotArea>
+      <cx:plotAreaRegion>
+        <cx:series layoutId="funnel" uniqueId="{F2925F94-A658-48D9-9DF5-5C8F75472BCF}">
+          <cx:tx>
+            <cx:txData>
+              <cx:f>Sheet1!$B$1</cx:f>
+              <cx:v>系列1</cx:v>
+            </cx:txData>
+          </cx:tx>
+          <cx:dataLabels>
+            <cx:visibility seriesName="0" categoryName="0" value="1"/>
+          </cx:dataLabels>
+          <cx:dataId val="0"/>
+        </cx:series>
+      </cx:plotAreaRegion>
+      <cx:axis id="0">
+        <cx:catScaling gapWidth="0.0599999987"/>
+        <cx:tickLabels/>
+      </cx:axis>
+    </cx:plotArea>
+  </cx:chart>
+</cx:chartSpace>
+</file>
+
 <file path=ppt/charts/colors1.xml><?xml version="1.0" encoding="utf-8"?>
 <cs:colorStyle xmlns:cs="http://schemas.microsoft.com/office/drawing/2012/chartStyle" xmlns:a="http://schemas.openxmlformats.org/drawingml/2006/main" meth="cycle" id="10">
   <a:schemeClr val="accent1"/>
@@ -1159,6 +2504,126 @@
 </cs:colorStyle>
 </file>
 
+<file path=ppt/charts/colors3.xml><?xml version="1.0" encoding="utf-8"?>
+<cs:colorStyle xmlns:cs="http://schemas.microsoft.com/office/drawing/2012/chartStyle" xmlns:a="http://schemas.openxmlformats.org/drawingml/2006/main" meth="cycle" id="10">
+  <a:schemeClr val="accent1"/>
+  <a:schemeClr val="accent2"/>
+  <a:schemeClr val="accent3"/>
+  <a:schemeClr val="accent4"/>
+  <a:schemeClr val="accent5"/>
+  <a:schemeClr val="accent6"/>
+  <cs:variation/>
+  <cs:variation>
+    <a:lumMod val="60000"/>
+  </cs:variation>
+  <cs:variation>
+    <a:lumMod val="80000"/>
+    <a:lumOff val="20000"/>
+  </cs:variation>
+  <cs:variation>
+    <a:lumMod val="80000"/>
+  </cs:variation>
+  <cs:variation>
+    <a:lumMod val="60000"/>
+    <a:lumOff val="40000"/>
+  </cs:variation>
+  <cs:variation>
+    <a:lumMod val="50000"/>
+  </cs:variation>
+  <cs:variation>
+    <a:lumMod val="70000"/>
+    <a:lumOff val="30000"/>
+  </cs:variation>
+  <cs:variation>
+    <a:lumMod val="70000"/>
+  </cs:variation>
+  <cs:variation>
+    <a:lumMod val="50000"/>
+    <a:lumOff val="50000"/>
+  </cs:variation>
+</cs:colorStyle>
+</file>
+
+<file path=ppt/charts/colors4.xml><?xml version="1.0" encoding="utf-8"?>
+<cs:colorStyle xmlns:cs="http://schemas.microsoft.com/office/drawing/2012/chartStyle" xmlns:a="http://schemas.openxmlformats.org/drawingml/2006/main" meth="cycle" id="10">
+  <a:schemeClr val="accent1"/>
+  <a:schemeClr val="accent2"/>
+  <a:schemeClr val="accent3"/>
+  <a:schemeClr val="accent4"/>
+  <a:schemeClr val="accent5"/>
+  <a:schemeClr val="accent6"/>
+  <cs:variation/>
+  <cs:variation>
+    <a:lumMod val="60000"/>
+  </cs:variation>
+  <cs:variation>
+    <a:lumMod val="80000"/>
+    <a:lumOff val="20000"/>
+  </cs:variation>
+  <cs:variation>
+    <a:lumMod val="80000"/>
+  </cs:variation>
+  <cs:variation>
+    <a:lumMod val="60000"/>
+    <a:lumOff val="40000"/>
+  </cs:variation>
+  <cs:variation>
+    <a:lumMod val="50000"/>
+  </cs:variation>
+  <cs:variation>
+    <a:lumMod val="70000"/>
+    <a:lumOff val="30000"/>
+  </cs:variation>
+  <cs:variation>
+    <a:lumMod val="70000"/>
+  </cs:variation>
+  <cs:variation>
+    <a:lumMod val="50000"/>
+    <a:lumOff val="50000"/>
+  </cs:variation>
+</cs:colorStyle>
+</file>
+
+<file path=ppt/charts/colors5.xml><?xml version="1.0" encoding="utf-8"?>
+<cs:colorStyle xmlns:cs="http://schemas.microsoft.com/office/drawing/2012/chartStyle" xmlns:a="http://schemas.openxmlformats.org/drawingml/2006/main" meth="cycle" id="10">
+  <a:schemeClr val="accent1"/>
+  <a:schemeClr val="accent2"/>
+  <a:schemeClr val="accent3"/>
+  <a:schemeClr val="accent4"/>
+  <a:schemeClr val="accent5"/>
+  <a:schemeClr val="accent6"/>
+  <cs:variation/>
+  <cs:variation>
+    <a:lumMod val="60000"/>
+  </cs:variation>
+  <cs:variation>
+    <a:lumMod val="80000"/>
+    <a:lumOff val="20000"/>
+  </cs:variation>
+  <cs:variation>
+    <a:lumMod val="80000"/>
+  </cs:variation>
+  <cs:variation>
+    <a:lumMod val="60000"/>
+    <a:lumOff val="40000"/>
+  </cs:variation>
+  <cs:variation>
+    <a:lumMod val="50000"/>
+  </cs:variation>
+  <cs:variation>
+    <a:lumMod val="70000"/>
+    <a:lumOff val="30000"/>
+  </cs:variation>
+  <cs:variation>
+    <a:lumMod val="70000"/>
+  </cs:variation>
+  <cs:variation>
+    <a:lumMod val="50000"/>
+    <a:lumOff val="50000"/>
+  </cs:variation>
+</cs:colorStyle>
+</file>
+
 <file path=ppt/charts/style1.xml><?xml version="1.0" encoding="utf-8"?>
 <cs:chartStyle xmlns:cs="http://schemas.microsoft.com/office/drawing/2012/chartStyle" xmlns:a="http://schemas.openxmlformats.org/drawingml/2006/main" id="201">
   <cs:axisTitle>
@@ -2174,6 +3639,1527 @@
         <a:noFill/>
       </a:ln>
     </cs:spPr>
+  </cs:wall>
+</cs:chartStyle>
+</file>
+
+<file path=ppt/charts/style3.xml><?xml version="1.0" encoding="utf-8"?>
+<cs:chartStyle xmlns:cs="http://schemas.microsoft.com/office/drawing/2012/chartStyle" xmlns:a="http://schemas.openxmlformats.org/drawingml/2006/main" id="216">
+  <cs:axisTitle>
+    <cs:lnRef idx="0"/>
+    <cs:fillRef idx="0"/>
+    <cs:effectRef idx="0"/>
+    <cs:fontRef idx="minor">
+      <a:schemeClr val="tx1">
+        <a:lumMod val="65000"/>
+        <a:lumOff val="35000"/>
+      </a:schemeClr>
+    </cs:fontRef>
+    <cs:defRPr sz="1330" kern="1200"/>
+  </cs:axisTitle>
+  <cs:categoryAxis>
+    <cs:lnRef idx="0"/>
+    <cs:fillRef idx="0"/>
+    <cs:effectRef idx="0"/>
+    <cs:fontRef idx="minor">
+      <a:schemeClr val="tx1">
+        <a:lumMod val="65000"/>
+        <a:lumOff val="35000"/>
+      </a:schemeClr>
+    </cs:fontRef>
+    <cs:spPr>
+      <a:ln w="9525" cap="flat" cmpd="sng" algn="ctr">
+        <a:solidFill>
+          <a:schemeClr val="tx1">
+            <a:lumMod val="15000"/>
+            <a:lumOff val="85000"/>
+          </a:schemeClr>
+        </a:solidFill>
+        <a:round/>
+      </a:ln>
+    </cs:spPr>
+    <cs:defRPr sz="1197" kern="1200"/>
+  </cs:categoryAxis>
+  <cs:chartArea mods="allowNoFillOverride allowNoLineOverride">
+    <cs:lnRef idx="0"/>
+    <cs:fillRef idx="0"/>
+    <cs:effectRef idx="0"/>
+    <cs:fontRef idx="minor">
+      <a:schemeClr val="tx1"/>
+    </cs:fontRef>
+    <cs:spPr>
+      <a:solidFill>
+        <a:schemeClr val="bg1"/>
+      </a:solidFill>
+      <a:ln w="9525" cap="flat" cmpd="sng" algn="ctr">
+        <a:solidFill>
+          <a:schemeClr val="tx1">
+            <a:lumMod val="15000"/>
+            <a:lumOff val="85000"/>
+          </a:schemeClr>
+        </a:solidFill>
+        <a:round/>
+      </a:ln>
+    </cs:spPr>
+    <cs:defRPr sz="1330" kern="1200"/>
+  </cs:chartArea>
+  <cs:dataLabel>
+    <cs:lnRef idx="0"/>
+    <cs:fillRef idx="0"/>
+    <cs:effectRef idx="0"/>
+    <cs:fontRef idx="minor">
+      <a:schemeClr val="tx1">
+        <a:lumMod val="75000"/>
+        <a:lumOff val="25000"/>
+      </a:schemeClr>
+    </cs:fontRef>
+    <cs:defRPr sz="1197" kern="1200"/>
+  </cs:dataLabel>
+  <cs:dataLabelCallout>
+    <cs:lnRef idx="0"/>
+    <cs:fillRef idx="0"/>
+    <cs:effectRef idx="0"/>
+    <cs:fontRef idx="minor">
+      <a:schemeClr val="dk1">
+        <a:lumMod val="65000"/>
+        <a:lumOff val="35000"/>
+      </a:schemeClr>
+    </cs:fontRef>
+    <cs:spPr>
+      <a:solidFill>
+        <a:schemeClr val="lt1"/>
+      </a:solidFill>
+      <a:ln>
+        <a:solidFill>
+          <a:schemeClr val="dk1">
+            <a:lumMod val="25000"/>
+            <a:lumOff val="75000"/>
+          </a:schemeClr>
+        </a:solidFill>
+      </a:ln>
+    </cs:spPr>
+    <cs:defRPr sz="1197" kern="1200"/>
+    <cs:bodyPr rot="0" spcFirstLastPara="1" vertOverflow="clip" horzOverflow="clip" vert="horz" wrap="square" lIns="36576" tIns="18288" rIns="36576" bIns="18288" anchor="ctr" anchorCtr="1">
+      <a:spAutoFit/>
+    </cs:bodyPr>
+  </cs:dataLabelCallout>
+  <cs:dataPoint>
+    <cs:lnRef idx="0"/>
+    <cs:fillRef idx="1">
+      <cs:styleClr val="auto"/>
+    </cs:fillRef>
+    <cs:effectRef idx="0"/>
+    <cs:fontRef idx="minor">
+      <a:schemeClr val="tx1"/>
+    </cs:fontRef>
+  </cs:dataPoint>
+  <cs:dataPoint3D>
+    <cs:lnRef idx="0"/>
+    <cs:fillRef idx="1">
+      <cs:styleClr val="auto"/>
+    </cs:fillRef>
+    <cs:effectRef idx="0"/>
+    <cs:fontRef idx="minor">
+      <a:schemeClr val="tx1"/>
+    </cs:fontRef>
+  </cs:dataPoint3D>
+  <cs:dataPointLine>
+    <cs:lnRef idx="0">
+      <cs:styleClr val="auto"/>
+    </cs:lnRef>
+    <cs:fillRef idx="1"/>
+    <cs:effectRef idx="0"/>
+    <cs:fontRef idx="minor">
+      <a:schemeClr val="tx1"/>
+    </cs:fontRef>
+    <cs:spPr>
+      <a:ln w="28575" cap="rnd">
+        <a:solidFill>
+          <a:schemeClr val="phClr"/>
+        </a:solidFill>
+        <a:round/>
+      </a:ln>
+    </cs:spPr>
+  </cs:dataPointLine>
+  <cs:dataPointMarker>
+    <cs:lnRef idx="0">
+      <cs:styleClr val="auto"/>
+    </cs:lnRef>
+    <cs:fillRef idx="1">
+      <cs:styleClr val="auto"/>
+    </cs:fillRef>
+    <cs:effectRef idx="0"/>
+    <cs:fontRef idx="minor">
+      <a:schemeClr val="tx1"/>
+    </cs:fontRef>
+    <cs:spPr>
+      <a:ln w="9525">
+        <a:solidFill>
+          <a:schemeClr val="phClr"/>
+        </a:solidFill>
+      </a:ln>
+    </cs:spPr>
+  </cs:dataPointMarker>
+  <cs:dataPointMarkerLayout symbol="circle" size="5"/>
+  <cs:dataPointWireframe>
+    <cs:lnRef idx="0">
+      <cs:styleClr val="auto"/>
+    </cs:lnRef>
+    <cs:fillRef idx="1"/>
+    <cs:effectRef idx="0"/>
+    <cs:fontRef idx="minor">
+      <a:schemeClr val="tx1"/>
+    </cs:fontRef>
+    <cs:spPr>
+      <a:ln w="9525" cap="rnd">
+        <a:solidFill>
+          <a:schemeClr val="phClr"/>
+        </a:solidFill>
+        <a:round/>
+      </a:ln>
+    </cs:spPr>
+  </cs:dataPointWireframe>
+  <cs:dataTable>
+    <cs:lnRef idx="0"/>
+    <cs:fillRef idx="0"/>
+    <cs:effectRef idx="0"/>
+    <cs:fontRef idx="minor">
+      <a:schemeClr val="tx1">
+        <a:lumMod val="65000"/>
+        <a:lumOff val="35000"/>
+      </a:schemeClr>
+    </cs:fontRef>
+    <cs:spPr>
+      <a:noFill/>
+      <a:ln w="9525" cap="flat" cmpd="sng" algn="ctr">
+        <a:solidFill>
+          <a:schemeClr val="tx1">
+            <a:lumMod val="15000"/>
+            <a:lumOff val="85000"/>
+          </a:schemeClr>
+        </a:solidFill>
+        <a:round/>
+      </a:ln>
+    </cs:spPr>
+    <cs:defRPr sz="1197" kern="1200"/>
+  </cs:dataTable>
+  <cs:downBar>
+    <cs:lnRef idx="0"/>
+    <cs:fillRef idx="0"/>
+    <cs:effectRef idx="0"/>
+    <cs:fontRef idx="minor">
+      <a:schemeClr val="tx1"/>
+    </cs:fontRef>
+    <cs:spPr>
+      <a:solidFill>
+        <a:schemeClr val="dk1">
+          <a:lumMod val="75000"/>
+          <a:lumOff val="25000"/>
+        </a:schemeClr>
+      </a:solidFill>
+      <a:ln w="9525" cap="flat" cmpd="sng" algn="ctr">
+        <a:solidFill>
+          <a:schemeClr val="tx1">
+            <a:lumMod val="65000"/>
+            <a:lumOff val="35000"/>
+          </a:schemeClr>
+        </a:solidFill>
+        <a:round/>
+      </a:ln>
+    </cs:spPr>
+  </cs:downBar>
+  <cs:dropLine>
+    <cs:lnRef idx="0"/>
+    <cs:fillRef idx="0"/>
+    <cs:effectRef idx="0"/>
+    <cs:fontRef idx="minor">
+      <a:schemeClr val="tx1"/>
+    </cs:fontRef>
+    <cs:spPr>
+      <a:ln w="9525" cap="flat" cmpd="sng" algn="ctr">
+        <a:solidFill>
+          <a:schemeClr val="tx1">
+            <a:lumMod val="35000"/>
+            <a:lumOff val="65000"/>
+          </a:schemeClr>
+        </a:solidFill>
+        <a:round/>
+      </a:ln>
+    </cs:spPr>
+  </cs:dropLine>
+  <cs:errorBar>
+    <cs:lnRef idx="0"/>
+    <cs:fillRef idx="0"/>
+    <cs:effectRef idx="0"/>
+    <cs:fontRef idx="minor">
+      <a:schemeClr val="tx1"/>
+    </cs:fontRef>
+    <cs:spPr>
+      <a:ln w="9525" cap="flat" cmpd="sng" algn="ctr">
+        <a:solidFill>
+          <a:schemeClr val="tx1">
+            <a:lumMod val="65000"/>
+            <a:lumOff val="35000"/>
+          </a:schemeClr>
+        </a:solidFill>
+        <a:round/>
+      </a:ln>
+    </cs:spPr>
+  </cs:errorBar>
+  <cs:floor>
+    <cs:lnRef idx="0"/>
+    <cs:fillRef idx="0"/>
+    <cs:effectRef idx="0"/>
+    <cs:fontRef idx="minor">
+      <a:schemeClr val="tx1"/>
+    </cs:fontRef>
+    <cs:spPr>
+      <a:noFill/>
+      <a:ln>
+        <a:noFill/>
+      </a:ln>
+    </cs:spPr>
+  </cs:floor>
+  <cs:gridlineMajor>
+    <cs:lnRef idx="0"/>
+    <cs:fillRef idx="0"/>
+    <cs:effectRef idx="0"/>
+    <cs:fontRef idx="minor">
+      <a:schemeClr val="tx1"/>
+    </cs:fontRef>
+    <cs:spPr>
+      <a:ln w="9525" cap="flat" cmpd="sng" algn="ctr">
+        <a:solidFill>
+          <a:schemeClr val="tx1">
+            <a:lumMod val="15000"/>
+            <a:lumOff val="85000"/>
+          </a:schemeClr>
+        </a:solidFill>
+        <a:round/>
+      </a:ln>
+    </cs:spPr>
+  </cs:gridlineMajor>
+  <cs:gridlineMinor>
+    <cs:lnRef idx="0"/>
+    <cs:fillRef idx="0"/>
+    <cs:effectRef idx="0"/>
+    <cs:fontRef idx="minor">
+      <a:schemeClr val="tx1"/>
+    </cs:fontRef>
+    <cs:spPr>
+      <a:ln w="9525" cap="flat" cmpd="sng" algn="ctr">
+        <a:solidFill>
+          <a:schemeClr val="tx1">
+            <a:lumMod val="5000"/>
+            <a:lumOff val="95000"/>
+          </a:schemeClr>
+        </a:solidFill>
+        <a:round/>
+      </a:ln>
+    </cs:spPr>
+  </cs:gridlineMinor>
+  <cs:hiLoLine>
+    <cs:lnRef idx="0"/>
+    <cs:fillRef idx="0"/>
+    <cs:effectRef idx="0"/>
+    <cs:fontRef idx="minor">
+      <a:schemeClr val="tx1"/>
+    </cs:fontRef>
+    <cs:spPr>
+      <a:ln w="9525" cap="flat" cmpd="sng" algn="ctr">
+        <a:solidFill>
+          <a:schemeClr val="tx1">
+            <a:lumMod val="50000"/>
+            <a:lumOff val="50000"/>
+          </a:schemeClr>
+        </a:solidFill>
+        <a:round/>
+      </a:ln>
+    </cs:spPr>
+  </cs:hiLoLine>
+  <cs:leaderLine>
+    <cs:lnRef idx="0"/>
+    <cs:fillRef idx="0"/>
+    <cs:effectRef idx="0"/>
+    <cs:fontRef idx="minor">
+      <a:schemeClr val="tx1"/>
+    </cs:fontRef>
+    <cs:spPr>
+      <a:ln w="9525" cap="flat" cmpd="sng" algn="ctr">
+        <a:solidFill>
+          <a:schemeClr val="tx1">
+            <a:lumMod val="35000"/>
+            <a:lumOff val="65000"/>
+          </a:schemeClr>
+        </a:solidFill>
+        <a:round/>
+      </a:ln>
+    </cs:spPr>
+  </cs:leaderLine>
+  <cs:legend>
+    <cs:lnRef idx="0"/>
+    <cs:fillRef idx="0"/>
+    <cs:effectRef idx="0"/>
+    <cs:fontRef idx="minor">
+      <a:schemeClr val="tx1">
+        <a:lumMod val="65000"/>
+        <a:lumOff val="35000"/>
+      </a:schemeClr>
+    </cs:fontRef>
+    <cs:defRPr sz="1197" kern="1200"/>
+  </cs:legend>
+  <cs:plotArea mods="allowNoFillOverride allowNoLineOverride">
+    <cs:lnRef idx="0"/>
+    <cs:fillRef idx="0"/>
+    <cs:effectRef idx="0"/>
+    <cs:fontRef idx="minor">
+      <a:schemeClr val="tx1"/>
+    </cs:fontRef>
+  </cs:plotArea>
+  <cs:plotArea3D mods="allowNoFillOverride allowNoLineOverride">
+    <cs:lnRef idx="0"/>
+    <cs:fillRef idx="0"/>
+    <cs:effectRef idx="0"/>
+    <cs:fontRef idx="minor">
+      <a:schemeClr val="tx1"/>
+    </cs:fontRef>
+  </cs:plotArea3D>
+  <cs:seriesAxis>
+    <cs:lnRef idx="0"/>
+    <cs:fillRef idx="0"/>
+    <cs:effectRef idx="0"/>
+    <cs:fontRef idx="minor">
+      <a:schemeClr val="tx1">
+        <a:lumMod val="65000"/>
+        <a:lumOff val="35000"/>
+      </a:schemeClr>
+    </cs:fontRef>
+    <cs:defRPr sz="1197" kern="1200"/>
+  </cs:seriesAxis>
+  <cs:seriesLine>
+    <cs:lnRef idx="0"/>
+    <cs:fillRef idx="0"/>
+    <cs:effectRef idx="0"/>
+    <cs:fontRef idx="minor">
+      <a:schemeClr val="tx1"/>
+    </cs:fontRef>
+    <cs:spPr>
+      <a:ln w="9525" cap="flat" cmpd="sng" algn="ctr">
+        <a:solidFill>
+          <a:schemeClr val="tx1">
+            <a:lumMod val="35000"/>
+            <a:lumOff val="65000"/>
+          </a:schemeClr>
+        </a:solidFill>
+        <a:round/>
+      </a:ln>
+    </cs:spPr>
+  </cs:seriesLine>
+  <cs:title>
+    <cs:lnRef idx="0"/>
+    <cs:fillRef idx="0"/>
+    <cs:effectRef idx="0"/>
+    <cs:fontRef idx="minor">
+      <a:schemeClr val="tx1">
+        <a:lumMod val="65000"/>
+        <a:lumOff val="35000"/>
+      </a:schemeClr>
+    </cs:fontRef>
+    <cs:defRPr sz="1862" b="0" kern="1200" spc="0" baseline="0"/>
+  </cs:title>
+  <cs:trendline>
+    <cs:lnRef idx="0">
+      <cs:styleClr val="auto"/>
+    </cs:lnRef>
+    <cs:fillRef idx="0"/>
+    <cs:effectRef idx="0"/>
+    <cs:fontRef idx="minor">
+      <a:schemeClr val="tx1"/>
+    </cs:fontRef>
+    <cs:spPr>
+      <a:ln w="19050" cap="rnd">
+        <a:solidFill>
+          <a:schemeClr val="phClr"/>
+        </a:solidFill>
+        <a:prstDash val="sysDot"/>
+      </a:ln>
+    </cs:spPr>
+  </cs:trendline>
+  <cs:trendlineLabel>
+    <cs:lnRef idx="0"/>
+    <cs:fillRef idx="0"/>
+    <cs:effectRef idx="0"/>
+    <cs:fontRef idx="minor">
+      <a:schemeClr val="tx1">
+        <a:lumMod val="65000"/>
+        <a:lumOff val="35000"/>
+      </a:schemeClr>
+    </cs:fontRef>
+    <cs:defRPr sz="1197" kern="1200"/>
+  </cs:trendlineLabel>
+  <cs:upBar>
+    <cs:lnRef idx="0"/>
+    <cs:fillRef idx="0"/>
+    <cs:effectRef idx="0"/>
+    <cs:fontRef idx="minor">
+      <a:schemeClr val="tx1"/>
+    </cs:fontRef>
+    <cs:spPr>
+      <a:solidFill>
+        <a:schemeClr val="lt1"/>
+      </a:solidFill>
+      <a:ln w="9525" cap="flat" cmpd="sng" algn="ctr">
+        <a:solidFill>
+          <a:schemeClr val="tx1">
+            <a:lumMod val="65000"/>
+            <a:lumOff val="35000"/>
+          </a:schemeClr>
+        </a:solidFill>
+        <a:round/>
+      </a:ln>
+    </cs:spPr>
+  </cs:upBar>
+  <cs:valueAxis>
+    <cs:lnRef idx="0"/>
+    <cs:fillRef idx="0"/>
+    <cs:effectRef idx="0"/>
+    <cs:fontRef idx="minor">
+      <a:schemeClr val="tx1">
+        <a:lumMod val="65000"/>
+        <a:lumOff val="35000"/>
+      </a:schemeClr>
+    </cs:fontRef>
+    <cs:defRPr sz="1197" kern="1200"/>
+  </cs:valueAxis>
+  <cs:wall>
+    <cs:lnRef idx="0"/>
+    <cs:fillRef idx="0"/>
+    <cs:effectRef idx="0"/>
+    <cs:fontRef idx="minor">
+      <a:schemeClr val="tx1"/>
+    </cs:fontRef>
+    <cs:spPr>
+      <a:noFill/>
+      <a:ln>
+        <a:noFill/>
+      </a:ln>
+    </cs:spPr>
+  </cs:wall>
+</cs:chartStyle>
+</file>
+
+<file path=ppt/charts/style4.xml><?xml version="1.0" encoding="utf-8"?>
+<cs:chartStyle xmlns:cs="http://schemas.microsoft.com/office/drawing/2012/chartStyle" xmlns:a="http://schemas.openxmlformats.org/drawingml/2006/main" id="366">
+  <cs:axisTitle>
+    <cs:lnRef idx="0"/>
+    <cs:fillRef idx="0"/>
+    <cs:effectRef idx="0"/>
+    <cs:fontRef idx="minor">
+      <a:schemeClr val="tx1">
+        <a:lumMod val="65000"/>
+        <a:lumOff val="35000"/>
+      </a:schemeClr>
+    </cs:fontRef>
+    <cs:defRPr sz="1197"/>
+  </cs:axisTitle>
+  <cs:categoryAxis>
+    <cs:lnRef idx="0"/>
+    <cs:fillRef idx="0"/>
+    <cs:effectRef idx="0"/>
+    <cs:fontRef idx="minor">
+      <a:schemeClr val="tx1">
+        <a:lumMod val="65000"/>
+        <a:lumOff val="35000"/>
+      </a:schemeClr>
+    </cs:fontRef>
+    <cs:spPr>
+      <a:ln w="9525" cap="flat" cmpd="sng" algn="ctr">
+        <a:solidFill>
+          <a:schemeClr val="tx1">
+            <a:lumMod val="15000"/>
+            <a:lumOff val="85000"/>
+          </a:schemeClr>
+        </a:solidFill>
+        <a:round/>
+      </a:ln>
+    </cs:spPr>
+    <cs:defRPr sz="1197"/>
+  </cs:categoryAxis>
+  <cs:chartArea mods="allowNoFillOverride allowNoLineOverride">
+    <cs:lnRef idx="0"/>
+    <cs:fillRef idx="0"/>
+    <cs:effectRef idx="0"/>
+    <cs:fontRef idx="minor">
+      <a:schemeClr val="tx1"/>
+    </cs:fontRef>
+    <cs:spPr>
+      <a:solidFill>
+        <a:schemeClr val="bg1"/>
+      </a:solidFill>
+      <a:ln w="9525" cap="flat" cmpd="sng" algn="ctr">
+        <a:solidFill>
+          <a:schemeClr val="tx1">
+            <a:lumMod val="15000"/>
+            <a:lumOff val="85000"/>
+          </a:schemeClr>
+        </a:solidFill>
+        <a:round/>
+      </a:ln>
+    </cs:spPr>
+    <cs:defRPr sz="1330"/>
+  </cs:chartArea>
+  <cs:dataLabel>
+    <cs:lnRef idx="0"/>
+    <cs:fillRef idx="0"/>
+    <cs:effectRef idx="0"/>
+    <cs:fontRef idx="minor">
+      <a:schemeClr val="tx1">
+        <a:lumMod val="65000"/>
+        <a:lumOff val="35000"/>
+      </a:schemeClr>
+    </cs:fontRef>
+    <cs:defRPr sz="1197"/>
+  </cs:dataLabel>
+  <cs:dataLabelCallout>
+    <cs:lnRef idx="0"/>
+    <cs:fillRef idx="0"/>
+    <cs:effectRef idx="0"/>
+    <cs:fontRef idx="minor">
+      <a:schemeClr val="dk1">
+        <a:lumMod val="65000"/>
+        <a:lumOff val="35000"/>
+      </a:schemeClr>
+    </cs:fontRef>
+    <cs:spPr>
+      <a:solidFill>
+        <a:schemeClr val="lt1"/>
+      </a:solidFill>
+      <a:ln>
+        <a:solidFill>
+          <a:schemeClr val="dk1">
+            <a:lumMod val="25000"/>
+            <a:lumOff val="75000"/>
+          </a:schemeClr>
+        </a:solidFill>
+      </a:ln>
+    </cs:spPr>
+    <cs:defRPr sz="1197"/>
+    <cs:bodyPr rot="0" spcFirstLastPara="1" vertOverflow="clip" horzOverflow="clip" vert="horz" wrap="square" lIns="36576" tIns="18288" rIns="36576" bIns="18288" anchor="ctr" anchorCtr="1">
+      <a:spAutoFit/>
+    </cs:bodyPr>
+  </cs:dataLabelCallout>
+  <cs:dataPoint>
+    <cs:lnRef idx="0"/>
+    <cs:fillRef idx="0">
+      <cs:styleClr val="auto"/>
+    </cs:fillRef>
+    <cs:effectRef idx="0"/>
+    <cs:fontRef idx="minor">
+      <a:schemeClr val="tx1"/>
+    </cs:fontRef>
+    <cs:spPr>
+      <a:solidFill>
+        <a:schemeClr val="phClr"/>
+      </a:solidFill>
+    </cs:spPr>
+  </cs:dataPoint>
+  <cs:dataPoint3D>
+    <cs:lnRef idx="0"/>
+    <cs:fillRef idx="0">
+      <cs:styleClr val="auto"/>
+    </cs:fillRef>
+    <cs:effectRef idx="0"/>
+    <cs:fontRef idx="minor">
+      <a:schemeClr val="tx1"/>
+    </cs:fontRef>
+    <cs:spPr>
+      <a:solidFill>
+        <a:schemeClr val="phClr"/>
+      </a:solidFill>
+    </cs:spPr>
+  </cs:dataPoint3D>
+  <cs:dataPointLine>
+    <cs:lnRef idx="0">
+      <cs:styleClr val="auto"/>
+    </cs:lnRef>
+    <cs:fillRef idx="0"/>
+    <cs:effectRef idx="0"/>
+    <cs:fontRef idx="minor">
+      <a:schemeClr val="tx1"/>
+    </cs:fontRef>
+    <cs:spPr>
+      <a:ln w="28575" cap="rnd">
+        <a:solidFill>
+          <a:schemeClr val="phClr"/>
+        </a:solidFill>
+        <a:round/>
+      </a:ln>
+    </cs:spPr>
+  </cs:dataPointLine>
+  <cs:dataPointMarker>
+    <cs:lnRef idx="0"/>
+    <cs:fillRef idx="0">
+      <cs:styleClr val="auto"/>
+    </cs:fillRef>
+    <cs:effectRef idx="0"/>
+    <cs:fontRef idx="minor">
+      <a:schemeClr val="tx1"/>
+    </cs:fontRef>
+    <cs:spPr>
+      <a:solidFill>
+        <a:schemeClr val="phClr"/>
+      </a:solidFill>
+      <a:ln w="9525">
+        <a:solidFill>
+          <a:schemeClr val="lt1"/>
+        </a:solidFill>
+      </a:ln>
+    </cs:spPr>
+  </cs:dataPointMarker>
+  <cs:dataPointMarkerLayout symbol="circle" size="5"/>
+  <cs:dataPointWireframe>
+    <cs:lnRef idx="0">
+      <cs:styleClr val="auto"/>
+    </cs:lnRef>
+    <cs:fillRef idx="0"/>
+    <cs:effectRef idx="0"/>
+    <cs:fontRef idx="minor">
+      <a:schemeClr val="tx1"/>
+    </cs:fontRef>
+    <cs:spPr>
+      <a:ln w="28575" cap="rnd">
+        <a:solidFill>
+          <a:schemeClr val="phClr"/>
+        </a:solidFill>
+        <a:round/>
+      </a:ln>
+    </cs:spPr>
+  </cs:dataPointWireframe>
+  <cs:dataTable>
+    <cs:lnRef idx="0"/>
+    <cs:fillRef idx="0"/>
+    <cs:effectRef idx="0"/>
+    <cs:fontRef idx="minor">
+      <a:schemeClr val="tx1">
+        <a:lumMod val="65000"/>
+        <a:lumOff val="35000"/>
+      </a:schemeClr>
+    </cs:fontRef>
+    <cs:spPr>
+      <a:ln w="9525">
+        <a:solidFill>
+          <a:schemeClr val="tx1">
+            <a:lumMod val="15000"/>
+            <a:lumOff val="85000"/>
+          </a:schemeClr>
+        </a:solidFill>
+      </a:ln>
+    </cs:spPr>
+    <cs:defRPr sz="1197"/>
+  </cs:dataTable>
+  <cs:downBar>
+    <cs:lnRef idx="0"/>
+    <cs:fillRef idx="0"/>
+    <cs:effectRef idx="0"/>
+    <cs:fontRef idx="minor">
+      <a:schemeClr val="dk1"/>
+    </cs:fontRef>
+    <cs:spPr>
+      <a:solidFill>
+        <a:schemeClr val="dk1">
+          <a:lumMod val="65000"/>
+          <a:lumOff val="35000"/>
+        </a:schemeClr>
+      </a:solidFill>
+      <a:ln w="9525">
+        <a:solidFill>
+          <a:schemeClr val="tx1">
+            <a:lumMod val="65000"/>
+            <a:lumOff val="35000"/>
+          </a:schemeClr>
+        </a:solidFill>
+      </a:ln>
+    </cs:spPr>
+  </cs:downBar>
+  <cs:dropLine>
+    <cs:lnRef idx="0"/>
+    <cs:fillRef idx="0"/>
+    <cs:effectRef idx="0"/>
+    <cs:fontRef idx="minor">
+      <a:schemeClr val="tx1"/>
+    </cs:fontRef>
+    <cs:spPr>
+      <a:ln w="9525" cap="flat" cmpd="sng" algn="ctr">
+        <a:solidFill>
+          <a:schemeClr val="tx1">
+            <a:lumMod val="35000"/>
+            <a:lumOff val="65000"/>
+          </a:schemeClr>
+        </a:solidFill>
+        <a:round/>
+      </a:ln>
+    </cs:spPr>
+  </cs:dropLine>
+  <cs:errorBar>
+    <cs:lnRef idx="0"/>
+    <cs:fillRef idx="0"/>
+    <cs:effectRef idx="0"/>
+    <cs:fontRef idx="minor">
+      <a:schemeClr val="tx1"/>
+    </cs:fontRef>
+    <cs:spPr>
+      <a:ln w="9525" cap="flat" cmpd="sng" algn="ctr">
+        <a:solidFill>
+          <a:schemeClr val="tx1">
+            <a:lumMod val="65000"/>
+            <a:lumOff val="35000"/>
+          </a:schemeClr>
+        </a:solidFill>
+        <a:round/>
+      </a:ln>
+    </cs:spPr>
+  </cs:errorBar>
+  <cs:floor>
+    <cs:lnRef idx="0"/>
+    <cs:fillRef idx="0"/>
+    <cs:effectRef idx="0"/>
+    <cs:fontRef idx="minor">
+      <a:schemeClr val="tx1"/>
+    </cs:fontRef>
+  </cs:floor>
+  <cs:gridlineMajor>
+    <cs:lnRef idx="0"/>
+    <cs:fillRef idx="0"/>
+    <cs:effectRef idx="0"/>
+    <cs:fontRef idx="minor">
+      <a:schemeClr val="tx1"/>
+    </cs:fontRef>
+    <cs:spPr>
+      <a:ln w="9525" cap="flat" cmpd="sng" algn="ctr">
+        <a:solidFill>
+          <a:schemeClr val="tx1">
+            <a:lumMod val="15000"/>
+            <a:lumOff val="85000"/>
+          </a:schemeClr>
+        </a:solidFill>
+        <a:round/>
+      </a:ln>
+    </cs:spPr>
+  </cs:gridlineMajor>
+  <cs:gridlineMinor>
+    <cs:lnRef idx="0"/>
+    <cs:fillRef idx="0"/>
+    <cs:effectRef idx="0"/>
+    <cs:fontRef idx="minor">
+      <a:schemeClr val="tx1"/>
+    </cs:fontRef>
+    <cs:spPr>
+      <a:ln w="9525" cap="flat" cmpd="sng" algn="ctr">
+        <a:solidFill>
+          <a:schemeClr val="tx1">
+            <a:lumMod val="15000"/>
+            <a:lumOff val="85000"/>
+          </a:schemeClr>
+        </a:solidFill>
+        <a:round/>
+      </a:ln>
+    </cs:spPr>
+  </cs:gridlineMinor>
+  <cs:hiLoLine>
+    <cs:lnRef idx="0"/>
+    <cs:fillRef idx="0"/>
+    <cs:effectRef idx="0"/>
+    <cs:fontRef idx="minor">
+      <a:schemeClr val="tx1"/>
+    </cs:fontRef>
+    <cs:spPr>
+      <a:ln w="9525" cap="flat" cmpd="sng" algn="ctr">
+        <a:solidFill>
+          <a:schemeClr val="tx1">
+            <a:lumMod val="75000"/>
+            <a:lumOff val="25000"/>
+          </a:schemeClr>
+        </a:solidFill>
+        <a:round/>
+      </a:ln>
+    </cs:spPr>
+  </cs:hiLoLine>
+  <cs:leaderLine>
+    <cs:lnRef idx="0"/>
+    <cs:fillRef idx="0"/>
+    <cs:effectRef idx="0"/>
+    <cs:fontRef idx="minor">
+      <a:schemeClr val="tx1"/>
+    </cs:fontRef>
+    <cs:spPr>
+      <a:ln w="9525" cap="flat" cmpd="sng" algn="ctr">
+        <a:solidFill>
+          <a:schemeClr val="tx1">
+            <a:lumMod val="35000"/>
+            <a:lumOff val="65000"/>
+          </a:schemeClr>
+        </a:solidFill>
+        <a:round/>
+      </a:ln>
+    </cs:spPr>
+  </cs:leaderLine>
+  <cs:legend>
+    <cs:lnRef idx="0"/>
+    <cs:fillRef idx="0"/>
+    <cs:effectRef idx="0"/>
+    <cs:fontRef idx="minor">
+      <a:schemeClr val="tx1">
+        <a:lumMod val="65000"/>
+        <a:lumOff val="35000"/>
+      </a:schemeClr>
+    </cs:fontRef>
+    <cs:defRPr sz="1197"/>
+  </cs:legend>
+  <cs:plotArea mods="allowNoFillOverride allowNoLineOverride">
+    <cs:lnRef idx="0"/>
+    <cs:fillRef idx="0"/>
+    <cs:effectRef idx="0"/>
+    <cs:fontRef idx="minor">
+      <a:schemeClr val="tx1"/>
+    </cs:fontRef>
+  </cs:plotArea>
+  <cs:plotArea3D mods="allowNoFillOverride allowNoLineOverride">
+    <cs:lnRef idx="0"/>
+    <cs:fillRef idx="0"/>
+    <cs:effectRef idx="0"/>
+    <cs:fontRef idx="minor">
+      <a:schemeClr val="tx1"/>
+    </cs:fontRef>
+  </cs:plotArea3D>
+  <cs:seriesAxis>
+    <cs:lnRef idx="0"/>
+    <cs:fillRef idx="0"/>
+    <cs:effectRef idx="0"/>
+    <cs:fontRef idx="minor">
+      <a:schemeClr val="tx1">
+        <a:lumMod val="65000"/>
+        <a:lumOff val="35000"/>
+      </a:schemeClr>
+    </cs:fontRef>
+    <cs:spPr>
+      <a:ln w="9525" cap="flat" cmpd="sng" algn="ctr">
+        <a:solidFill>
+          <a:schemeClr val="tx1">
+            <a:lumMod val="15000"/>
+            <a:lumOff val="85000"/>
+          </a:schemeClr>
+        </a:solidFill>
+        <a:round/>
+      </a:ln>
+    </cs:spPr>
+    <cs:defRPr sz="1197"/>
+  </cs:seriesAxis>
+  <cs:seriesLine>
+    <cs:lnRef idx="0"/>
+    <cs:fillRef idx="0"/>
+    <cs:effectRef idx="0"/>
+    <cs:fontRef idx="minor">
+      <a:schemeClr val="tx1"/>
+    </cs:fontRef>
+    <cs:spPr>
+      <a:ln w="9525" cap="flat">
+        <a:solidFill>
+          <a:srgbClr val="D9D9D9"/>
+        </a:solidFill>
+        <a:round/>
+      </a:ln>
+    </cs:spPr>
+  </cs:seriesLine>
+  <cs:title>
+    <cs:lnRef idx="0"/>
+    <cs:fillRef idx="0"/>
+    <cs:effectRef idx="0"/>
+    <cs:fontRef idx="minor">
+      <a:schemeClr val="tx1">
+        <a:lumMod val="65000"/>
+        <a:lumOff val="35000"/>
+      </a:schemeClr>
+    </cs:fontRef>
+    <cs:defRPr sz="1862"/>
+  </cs:title>
+  <cs:trendline>
+    <cs:lnRef idx="0">
+      <cs:styleClr val="auto"/>
+    </cs:lnRef>
+    <cs:fillRef idx="0"/>
+    <cs:effectRef idx="0"/>
+    <cs:fontRef idx="minor">
+      <a:schemeClr val="tx1"/>
+    </cs:fontRef>
+    <cs:spPr>
+      <a:ln w="19050" cap="rnd">
+        <a:solidFill>
+          <a:schemeClr val="phClr"/>
+        </a:solidFill>
+        <a:prstDash val="sysDash"/>
+      </a:ln>
+    </cs:spPr>
+  </cs:trendline>
+  <cs:trendlineLabel>
+    <cs:lnRef idx="0"/>
+    <cs:fillRef idx="0"/>
+    <cs:effectRef idx="0"/>
+    <cs:fontRef idx="minor">
+      <a:schemeClr val="tx1">
+        <a:lumMod val="65000"/>
+        <a:lumOff val="35000"/>
+      </a:schemeClr>
+    </cs:fontRef>
+    <cs:defRPr sz="1197"/>
+  </cs:trendlineLabel>
+  <cs:upBar>
+    <cs:lnRef idx="0"/>
+    <cs:fillRef idx="0"/>
+    <cs:effectRef idx="0"/>
+    <cs:fontRef idx="minor">
+      <a:schemeClr val="dk1"/>
+    </cs:fontRef>
+    <cs:spPr>
+      <a:solidFill>
+        <a:schemeClr val="lt1"/>
+      </a:solidFill>
+      <a:ln w="9525">
+        <a:solidFill>
+          <a:schemeClr val="tx1">
+            <a:lumMod val="15000"/>
+            <a:lumOff val="85000"/>
+          </a:schemeClr>
+        </a:solidFill>
+      </a:ln>
+    </cs:spPr>
+  </cs:upBar>
+  <cs:valueAxis>
+    <cs:lnRef idx="0"/>
+    <cs:fillRef idx="0"/>
+    <cs:effectRef idx="0"/>
+    <cs:fontRef idx="minor">
+      <a:schemeClr val="tx1">
+        <a:lumMod val="65000"/>
+        <a:lumOff val="35000"/>
+      </a:schemeClr>
+    </cs:fontRef>
+    <cs:defRPr sz="1197"/>
+  </cs:valueAxis>
+  <cs:wall>
+    <cs:lnRef idx="0"/>
+    <cs:fillRef idx="0"/>
+    <cs:effectRef idx="0"/>
+    <cs:fontRef idx="minor">
+      <a:schemeClr val="tx1"/>
+    </cs:fontRef>
+  </cs:wall>
+</cs:chartStyle>
+</file>
+
+<file path=ppt/charts/style5.xml><?xml version="1.0" encoding="utf-8"?>
+<cs:chartStyle xmlns:cs="http://schemas.microsoft.com/office/drawing/2012/chartStyle" xmlns:a="http://schemas.openxmlformats.org/drawingml/2006/main" id="419">
+  <cs:axisTitle>
+    <cs:lnRef idx="0"/>
+    <cs:fillRef idx="0"/>
+    <cs:effectRef idx="0"/>
+    <cs:fontRef idx="minor">
+      <a:schemeClr val="tx1">
+        <a:lumMod val="65000"/>
+        <a:lumOff val="35000"/>
+      </a:schemeClr>
+    </cs:fontRef>
+    <cs:defRPr sz="1197"/>
+  </cs:axisTitle>
+  <cs:categoryAxis>
+    <cs:lnRef idx="0"/>
+    <cs:fillRef idx="0"/>
+    <cs:effectRef idx="0"/>
+    <cs:fontRef idx="minor">
+      <a:schemeClr val="tx1">
+        <a:lumMod val="65000"/>
+        <a:lumOff val="35000"/>
+      </a:schemeClr>
+    </cs:fontRef>
+    <cs:spPr>
+      <a:ln w="9525" cap="flat" cmpd="sng" algn="ctr">
+        <a:solidFill>
+          <a:schemeClr val="tx1">
+            <a:lumMod val="15000"/>
+            <a:lumOff val="85000"/>
+          </a:schemeClr>
+        </a:solidFill>
+        <a:round/>
+      </a:ln>
+    </cs:spPr>
+    <cs:defRPr sz="1197"/>
+  </cs:categoryAxis>
+  <cs:chartArea mods="allowNoFillOverride allowNoLineOverride">
+    <cs:lnRef idx="0"/>
+    <cs:fillRef idx="0"/>
+    <cs:effectRef idx="0"/>
+    <cs:fontRef idx="minor">
+      <a:schemeClr val="tx1"/>
+    </cs:fontRef>
+    <cs:spPr>
+      <a:solidFill>
+        <a:schemeClr val="bg1"/>
+      </a:solidFill>
+      <a:ln w="9525" cap="flat" cmpd="sng" algn="ctr">
+        <a:solidFill>
+          <a:schemeClr val="tx1">
+            <a:lumMod val="15000"/>
+            <a:lumOff val="85000"/>
+          </a:schemeClr>
+        </a:solidFill>
+        <a:round/>
+      </a:ln>
+    </cs:spPr>
+    <cs:defRPr sz="1330"/>
+  </cs:chartArea>
+  <cs:dataLabel>
+    <cs:lnRef idx="0"/>
+    <cs:fillRef idx="0"/>
+    <cs:effectRef idx="0"/>
+    <cs:fontRef idx="minor">
+      <a:schemeClr val="tx1">
+        <a:lumMod val="65000"/>
+        <a:lumOff val="35000"/>
+      </a:schemeClr>
+    </cs:fontRef>
+    <cs:defRPr sz="1197"/>
+  </cs:dataLabel>
+  <cs:dataLabelCallout>
+    <cs:lnRef idx="0"/>
+    <cs:fillRef idx="0"/>
+    <cs:effectRef idx="0"/>
+    <cs:fontRef idx="minor">
+      <a:schemeClr val="dk1">
+        <a:lumMod val="65000"/>
+        <a:lumOff val="35000"/>
+      </a:schemeClr>
+    </cs:fontRef>
+    <cs:spPr>
+      <a:solidFill>
+        <a:schemeClr val="lt1"/>
+      </a:solidFill>
+      <a:ln>
+        <a:solidFill>
+          <a:schemeClr val="dk1">
+            <a:lumMod val="25000"/>
+            <a:lumOff val="75000"/>
+          </a:schemeClr>
+        </a:solidFill>
+      </a:ln>
+    </cs:spPr>
+    <cs:defRPr sz="1197"/>
+    <cs:bodyPr rot="0" spcFirstLastPara="1" vertOverflow="clip" horzOverflow="clip" vert="horz" wrap="square" lIns="36576" tIns="18288" rIns="36576" bIns="18288" anchor="ctr" anchorCtr="1">
+      <a:spAutoFit/>
+    </cs:bodyPr>
+  </cs:dataLabelCallout>
+  <cs:dataPoint>
+    <cs:lnRef idx="0"/>
+    <cs:fillRef idx="0">
+      <cs:styleClr val="auto"/>
+    </cs:fillRef>
+    <cs:effectRef idx="0"/>
+    <cs:fontRef idx="minor">
+      <a:schemeClr val="tx1"/>
+    </cs:fontRef>
+    <cs:spPr>
+      <a:solidFill>
+        <a:schemeClr val="phClr"/>
+      </a:solidFill>
+    </cs:spPr>
+  </cs:dataPoint>
+  <cs:dataPoint3D>
+    <cs:lnRef idx="0"/>
+    <cs:fillRef idx="0">
+      <cs:styleClr val="auto"/>
+    </cs:fillRef>
+    <cs:effectRef idx="0"/>
+    <cs:fontRef idx="minor">
+      <a:schemeClr val="tx1"/>
+    </cs:fontRef>
+    <cs:spPr>
+      <a:solidFill>
+        <a:schemeClr val="phClr"/>
+      </a:solidFill>
+    </cs:spPr>
+  </cs:dataPoint3D>
+  <cs:dataPointLine>
+    <cs:lnRef idx="0">
+      <cs:styleClr val="auto"/>
+    </cs:lnRef>
+    <cs:fillRef idx="0"/>
+    <cs:effectRef idx="0"/>
+    <cs:fontRef idx="minor">
+      <a:schemeClr val="tx1"/>
+    </cs:fontRef>
+    <cs:spPr>
+      <a:ln w="28575" cap="rnd">
+        <a:solidFill>
+          <a:schemeClr val="phClr"/>
+        </a:solidFill>
+        <a:round/>
+      </a:ln>
+    </cs:spPr>
+  </cs:dataPointLine>
+  <cs:dataPointMarker>
+    <cs:lnRef idx="0"/>
+    <cs:fillRef idx="0">
+      <cs:styleClr val="auto"/>
+    </cs:fillRef>
+    <cs:effectRef idx="0"/>
+    <cs:fontRef idx="minor">
+      <a:schemeClr val="tx1"/>
+    </cs:fontRef>
+    <cs:spPr>
+      <a:solidFill>
+        <a:schemeClr val="phClr"/>
+      </a:solidFill>
+      <a:ln w="9525">
+        <a:solidFill>
+          <a:schemeClr val="lt1"/>
+        </a:solidFill>
+      </a:ln>
+    </cs:spPr>
+  </cs:dataPointMarker>
+  <cs:dataPointMarkerLayout symbol="circle" size="5"/>
+  <cs:dataPointWireframe>
+    <cs:lnRef idx="0">
+      <cs:styleClr val="auto"/>
+    </cs:lnRef>
+    <cs:fillRef idx="0"/>
+    <cs:effectRef idx="0"/>
+    <cs:fontRef idx="minor">
+      <a:schemeClr val="tx1"/>
+    </cs:fontRef>
+    <cs:spPr>
+      <a:ln w="28575" cap="rnd">
+        <a:solidFill>
+          <a:schemeClr val="phClr"/>
+        </a:solidFill>
+        <a:round/>
+      </a:ln>
+    </cs:spPr>
+  </cs:dataPointWireframe>
+  <cs:dataTable>
+    <cs:lnRef idx="0"/>
+    <cs:fillRef idx="0"/>
+    <cs:effectRef idx="0"/>
+    <cs:fontRef idx="minor">
+      <a:schemeClr val="tx1">
+        <a:lumMod val="65000"/>
+        <a:lumOff val="35000"/>
+      </a:schemeClr>
+    </cs:fontRef>
+    <cs:spPr>
+      <a:ln w="9525">
+        <a:solidFill>
+          <a:schemeClr val="tx1">
+            <a:lumMod val="15000"/>
+            <a:lumOff val="85000"/>
+          </a:schemeClr>
+        </a:solidFill>
+      </a:ln>
+    </cs:spPr>
+    <cs:defRPr sz="1197"/>
+  </cs:dataTable>
+  <cs:downBar>
+    <cs:lnRef idx="0"/>
+    <cs:fillRef idx="0"/>
+    <cs:effectRef idx="0"/>
+    <cs:fontRef idx="minor">
+      <a:schemeClr val="dk1"/>
+    </cs:fontRef>
+    <cs:spPr>
+      <a:solidFill>
+        <a:schemeClr val="dk1">
+          <a:lumMod val="65000"/>
+          <a:lumOff val="35000"/>
+        </a:schemeClr>
+      </a:solidFill>
+      <a:ln w="9525">
+        <a:solidFill>
+          <a:schemeClr val="tx1">
+            <a:lumMod val="65000"/>
+            <a:lumOff val="35000"/>
+          </a:schemeClr>
+        </a:solidFill>
+      </a:ln>
+    </cs:spPr>
+  </cs:downBar>
+  <cs:dropLine>
+    <cs:lnRef idx="0"/>
+    <cs:fillRef idx="0"/>
+    <cs:effectRef idx="0"/>
+    <cs:fontRef idx="minor">
+      <a:schemeClr val="tx1"/>
+    </cs:fontRef>
+    <cs:spPr>
+      <a:ln w="9525" cap="flat" cmpd="sng" algn="ctr">
+        <a:solidFill>
+          <a:schemeClr val="tx1">
+            <a:lumMod val="35000"/>
+            <a:lumOff val="65000"/>
+          </a:schemeClr>
+        </a:solidFill>
+        <a:round/>
+      </a:ln>
+    </cs:spPr>
+  </cs:dropLine>
+  <cs:errorBar>
+    <cs:lnRef idx="0"/>
+    <cs:fillRef idx="0"/>
+    <cs:effectRef idx="0"/>
+    <cs:fontRef idx="minor">
+      <a:schemeClr val="tx1"/>
+    </cs:fontRef>
+    <cs:spPr>
+      <a:ln w="9525" cap="flat" cmpd="sng" algn="ctr">
+        <a:solidFill>
+          <a:schemeClr val="tx1">
+            <a:lumMod val="65000"/>
+            <a:lumOff val="35000"/>
+          </a:schemeClr>
+        </a:solidFill>
+        <a:round/>
+      </a:ln>
+    </cs:spPr>
+  </cs:errorBar>
+  <cs:floor>
+    <cs:lnRef idx="0"/>
+    <cs:fillRef idx="0"/>
+    <cs:effectRef idx="0"/>
+    <cs:fontRef idx="minor">
+      <a:schemeClr val="tx1"/>
+    </cs:fontRef>
+  </cs:floor>
+  <cs:gridlineMajor>
+    <cs:lnRef idx="0"/>
+    <cs:fillRef idx="0"/>
+    <cs:effectRef idx="0"/>
+    <cs:fontRef idx="minor">
+      <a:schemeClr val="tx1"/>
+    </cs:fontRef>
+    <cs:spPr>
+      <a:ln w="9525" cap="flat" cmpd="sng" algn="ctr">
+        <a:solidFill>
+          <a:schemeClr val="tx1">
+            <a:lumMod val="15000"/>
+            <a:lumOff val="85000"/>
+          </a:schemeClr>
+        </a:solidFill>
+        <a:round/>
+      </a:ln>
+    </cs:spPr>
+  </cs:gridlineMajor>
+  <cs:gridlineMinor>
+    <cs:lnRef idx="0"/>
+    <cs:fillRef idx="0"/>
+    <cs:effectRef idx="0"/>
+    <cs:fontRef idx="minor">
+      <a:schemeClr val="tx1"/>
+    </cs:fontRef>
+    <cs:spPr>
+      <a:ln w="9525" cap="flat" cmpd="sng" algn="ctr">
+        <a:solidFill>
+          <a:schemeClr val="tx1">
+            <a:lumMod val="15000"/>
+            <a:lumOff val="85000"/>
+          </a:schemeClr>
+        </a:solidFill>
+        <a:round/>
+      </a:ln>
+    </cs:spPr>
+  </cs:gridlineMinor>
+  <cs:hiLoLine>
+    <cs:lnRef idx="0"/>
+    <cs:fillRef idx="0"/>
+    <cs:effectRef idx="0"/>
+    <cs:fontRef idx="minor">
+      <a:schemeClr val="tx1"/>
+    </cs:fontRef>
+    <cs:spPr>
+      <a:ln w="9525" cap="flat" cmpd="sng" algn="ctr">
+        <a:solidFill>
+          <a:schemeClr val="tx1">
+            <a:lumMod val="75000"/>
+            <a:lumOff val="25000"/>
+          </a:schemeClr>
+        </a:solidFill>
+        <a:round/>
+      </a:ln>
+    </cs:spPr>
+  </cs:hiLoLine>
+  <cs:leaderLine>
+    <cs:lnRef idx="0"/>
+    <cs:fillRef idx="0"/>
+    <cs:effectRef idx="0"/>
+    <cs:fontRef idx="minor">
+      <a:schemeClr val="tx1"/>
+    </cs:fontRef>
+    <cs:spPr>
+      <a:ln w="9525" cap="flat" cmpd="sng" algn="ctr">
+        <a:solidFill>
+          <a:schemeClr val="tx1">
+            <a:lumMod val="35000"/>
+            <a:lumOff val="65000"/>
+          </a:schemeClr>
+        </a:solidFill>
+        <a:round/>
+      </a:ln>
+    </cs:spPr>
+  </cs:leaderLine>
+  <cs:legend>
+    <cs:lnRef idx="0"/>
+    <cs:fillRef idx="0"/>
+    <cs:effectRef idx="0"/>
+    <cs:fontRef idx="minor">
+      <a:schemeClr val="tx1">
+        <a:lumMod val="65000"/>
+        <a:lumOff val="35000"/>
+      </a:schemeClr>
+    </cs:fontRef>
+    <cs:defRPr sz="1197"/>
+  </cs:legend>
+  <cs:plotArea mods="allowNoFillOverride allowNoLineOverride">
+    <cs:lnRef idx="0"/>
+    <cs:fillRef idx="0"/>
+    <cs:effectRef idx="0"/>
+    <cs:fontRef idx="minor">
+      <a:schemeClr val="tx1"/>
+    </cs:fontRef>
+  </cs:plotArea>
+  <cs:plotArea3D mods="allowNoFillOverride allowNoLineOverride">
+    <cs:lnRef idx="0"/>
+    <cs:fillRef idx="0"/>
+    <cs:effectRef idx="0"/>
+    <cs:fontRef idx="minor">
+      <a:schemeClr val="tx1"/>
+    </cs:fontRef>
+  </cs:plotArea3D>
+  <cs:seriesAxis>
+    <cs:lnRef idx="0"/>
+    <cs:fillRef idx="0"/>
+    <cs:effectRef idx="0"/>
+    <cs:fontRef idx="minor">
+      <a:schemeClr val="tx1">
+        <a:lumMod val="65000"/>
+        <a:lumOff val="35000"/>
+      </a:schemeClr>
+    </cs:fontRef>
+    <cs:spPr>
+      <a:ln w="9525" cap="flat" cmpd="sng" algn="ctr">
+        <a:solidFill>
+          <a:schemeClr val="tx1">
+            <a:lumMod val="15000"/>
+            <a:lumOff val="85000"/>
+          </a:schemeClr>
+        </a:solidFill>
+        <a:round/>
+      </a:ln>
+    </cs:spPr>
+    <cs:defRPr sz="1197"/>
+  </cs:seriesAxis>
+  <cs:seriesLine>
+    <cs:lnRef idx="0"/>
+    <cs:fillRef idx="0"/>
+    <cs:effectRef idx="0"/>
+    <cs:fontRef idx="minor">
+      <a:schemeClr val="tx1"/>
+    </cs:fontRef>
+    <cs:spPr>
+      <a:ln w="9525" cap="flat">
+        <a:solidFill>
+          <a:srgbClr val="D9D9D9"/>
+        </a:solidFill>
+        <a:round/>
+      </a:ln>
+    </cs:spPr>
+  </cs:seriesLine>
+  <cs:title>
+    <cs:lnRef idx="0"/>
+    <cs:fillRef idx="0"/>
+    <cs:effectRef idx="0"/>
+    <cs:fontRef idx="minor">
+      <a:schemeClr val="tx1">
+        <a:lumMod val="65000"/>
+        <a:lumOff val="35000"/>
+      </a:schemeClr>
+    </cs:fontRef>
+    <cs:defRPr sz="1862"/>
+  </cs:title>
+  <cs:trendline>
+    <cs:lnRef idx="0">
+      <cs:styleClr val="auto"/>
+    </cs:lnRef>
+    <cs:fillRef idx="0"/>
+    <cs:effectRef idx="0"/>
+    <cs:fontRef idx="minor">
+      <a:schemeClr val="tx1"/>
+    </cs:fontRef>
+    <cs:spPr>
+      <a:ln w="19050" cap="rnd">
+        <a:solidFill>
+          <a:schemeClr val="phClr"/>
+        </a:solidFill>
+        <a:prstDash val="sysDash"/>
+      </a:ln>
+    </cs:spPr>
+  </cs:trendline>
+  <cs:trendlineLabel>
+    <cs:lnRef idx="0"/>
+    <cs:fillRef idx="0"/>
+    <cs:effectRef idx="0"/>
+    <cs:fontRef idx="minor">
+      <a:schemeClr val="tx1">
+        <a:lumMod val="65000"/>
+        <a:lumOff val="35000"/>
+      </a:schemeClr>
+    </cs:fontRef>
+    <cs:defRPr sz="1197"/>
+  </cs:trendlineLabel>
+  <cs:upBar>
+    <cs:lnRef idx="0"/>
+    <cs:fillRef idx="0"/>
+    <cs:effectRef idx="0"/>
+    <cs:fontRef idx="minor">
+      <a:schemeClr val="dk1"/>
+    </cs:fontRef>
+    <cs:spPr>
+      <a:solidFill>
+        <a:schemeClr val="lt1"/>
+      </a:solidFill>
+      <a:ln w="9525">
+        <a:solidFill>
+          <a:schemeClr val="tx1">
+            <a:lumMod val="15000"/>
+            <a:lumOff val="85000"/>
+          </a:schemeClr>
+        </a:solidFill>
+      </a:ln>
+    </cs:spPr>
+  </cs:upBar>
+  <cs:valueAxis>
+    <cs:lnRef idx="0"/>
+    <cs:fillRef idx="0"/>
+    <cs:effectRef idx="0"/>
+    <cs:fontRef idx="minor">
+      <a:schemeClr val="tx1">
+        <a:lumMod val="65000"/>
+        <a:lumOff val="35000"/>
+      </a:schemeClr>
+    </cs:fontRef>
+    <cs:defRPr sz="1197"/>
+  </cs:valueAxis>
+  <cs:wall>
+    <cs:lnRef idx="0"/>
+    <cs:fillRef idx="0"/>
+    <cs:effectRef idx="0"/>
+    <cs:fontRef idx="minor">
+      <a:schemeClr val="tx1"/>
+    </cs:fontRef>
   </cs:wall>
 </cs:chartStyle>
 </file>
@@ -2325,7 +5311,7 @@
           <a:p>
             <a:fld id="{C581C49E-32C8-4992-8FB9-5248D85C126F}" type="datetimeFigureOut">
               <a:rPr kumimoji="1" lang="ja-JP" altLang="en-US" smtClean="0"/>
-              <a:t>2020/11/9</a:t>
+              <a:t>2020/11/11</a:t>
             </a:fld>
             <a:endParaRPr kumimoji="1" lang="ja-JP" altLang="en-US"/>
           </a:p>
@@ -2555,7 +5541,7 @@
           <a:p>
             <a:fld id="{C581C49E-32C8-4992-8FB9-5248D85C126F}" type="datetimeFigureOut">
               <a:rPr kumimoji="1" lang="ja-JP" altLang="en-US" smtClean="0"/>
-              <a:t>2020/11/9</a:t>
+              <a:t>2020/11/11</a:t>
             </a:fld>
             <a:endParaRPr kumimoji="1" lang="ja-JP" altLang="en-US"/>
           </a:p>
@@ -2795,7 +5781,7 @@
           <a:p>
             <a:fld id="{C581C49E-32C8-4992-8FB9-5248D85C126F}" type="datetimeFigureOut">
               <a:rPr kumimoji="1" lang="ja-JP" altLang="en-US" smtClean="0"/>
-              <a:t>2020/11/9</a:t>
+              <a:t>2020/11/11</a:t>
             </a:fld>
             <a:endParaRPr kumimoji="1" lang="ja-JP" altLang="en-US"/>
           </a:p>
@@ -3025,7 +6011,7 @@
           <a:p>
             <a:fld id="{C581C49E-32C8-4992-8FB9-5248D85C126F}" type="datetimeFigureOut">
               <a:rPr kumimoji="1" lang="ja-JP" altLang="en-US" smtClean="0"/>
-              <a:t>2020/11/9</a:t>
+              <a:t>2020/11/11</a:t>
             </a:fld>
             <a:endParaRPr kumimoji="1" lang="ja-JP" altLang="en-US"/>
           </a:p>
@@ -3300,7 +6286,7 @@
           <a:p>
             <a:fld id="{C581C49E-32C8-4992-8FB9-5248D85C126F}" type="datetimeFigureOut">
               <a:rPr kumimoji="1" lang="ja-JP" altLang="en-US" smtClean="0"/>
-              <a:t>2020/11/9</a:t>
+              <a:t>2020/11/11</a:t>
             </a:fld>
             <a:endParaRPr kumimoji="1" lang="ja-JP" altLang="en-US"/>
           </a:p>
@@ -3629,7 +6615,7 @@
           <a:p>
             <a:fld id="{C581C49E-32C8-4992-8FB9-5248D85C126F}" type="datetimeFigureOut">
               <a:rPr kumimoji="1" lang="ja-JP" altLang="en-US" smtClean="0"/>
-              <a:t>2020/11/9</a:t>
+              <a:t>2020/11/11</a:t>
             </a:fld>
             <a:endParaRPr kumimoji="1" lang="ja-JP" altLang="en-US"/>
           </a:p>
@@ -4105,7 +7091,7 @@
           <a:p>
             <a:fld id="{C581C49E-32C8-4992-8FB9-5248D85C126F}" type="datetimeFigureOut">
               <a:rPr kumimoji="1" lang="ja-JP" altLang="en-US" smtClean="0"/>
-              <a:t>2020/11/9</a:t>
+              <a:t>2020/11/11</a:t>
             </a:fld>
             <a:endParaRPr kumimoji="1" lang="ja-JP" altLang="en-US"/>
           </a:p>
@@ -4246,7 +7232,7 @@
           <a:p>
             <a:fld id="{C581C49E-32C8-4992-8FB9-5248D85C126F}" type="datetimeFigureOut">
               <a:rPr kumimoji="1" lang="ja-JP" altLang="en-US" smtClean="0"/>
-              <a:t>2020/11/9</a:t>
+              <a:t>2020/11/11</a:t>
             </a:fld>
             <a:endParaRPr kumimoji="1" lang="ja-JP" altLang="en-US"/>
           </a:p>
@@ -4359,7 +7345,7 @@
           <a:p>
             <a:fld id="{C581C49E-32C8-4992-8FB9-5248D85C126F}" type="datetimeFigureOut">
               <a:rPr kumimoji="1" lang="ja-JP" altLang="en-US" smtClean="0"/>
-              <a:t>2020/11/9</a:t>
+              <a:t>2020/11/11</a:t>
             </a:fld>
             <a:endParaRPr kumimoji="1" lang="ja-JP" altLang="en-US"/>
           </a:p>
@@ -4702,7 +7688,7 @@
           <a:p>
             <a:fld id="{C581C49E-32C8-4992-8FB9-5248D85C126F}" type="datetimeFigureOut">
               <a:rPr kumimoji="1" lang="ja-JP" altLang="en-US" smtClean="0"/>
-              <a:t>2020/11/9</a:t>
+              <a:t>2020/11/11</a:t>
             </a:fld>
             <a:endParaRPr kumimoji="1" lang="ja-JP" altLang="en-US"/>
           </a:p>
@@ -4990,7 +7976,7 @@
           <a:p>
             <a:fld id="{C581C49E-32C8-4992-8FB9-5248D85C126F}" type="datetimeFigureOut">
               <a:rPr kumimoji="1" lang="ja-JP" altLang="en-US" smtClean="0"/>
-              <a:t>2020/11/9</a:t>
+              <a:t>2020/11/11</a:t>
             </a:fld>
             <a:endParaRPr kumimoji="1" lang="ja-JP" altLang="en-US"/>
           </a:p>
@@ -5263,7 +8249,7 @@
           <a:p>
             <a:fld id="{C581C49E-32C8-4992-8FB9-5248D85C126F}" type="datetimeFigureOut">
               <a:rPr kumimoji="1" lang="ja-JP" altLang="en-US" smtClean="0"/>
-              <a:t>2020/11/9</a:t>
+              <a:t>2020/11/11</a:t>
             </a:fld>
             <a:endParaRPr kumimoji="1" lang="ja-JP" altLang="en-US"/>
           </a:p>
@@ -5690,13 +8676,7 @@
             </a:extLst>
           </p:cNvPr>
           <p:cNvGraphicFramePr/>
-          <p:nvPr>
-            <p:extLst>
-              <p:ext uri="{D42A27DB-BD31-4B8C-83A1-F6EECF244321}">
-                <p14:modId xmlns:p14="http://schemas.microsoft.com/office/powerpoint/2010/main" val="813115768"/>
-              </p:ext>
-            </p:extLst>
-          </p:nvPr>
+          <p:nvPr/>
         </p:nvGraphicFramePr>
         <p:xfrm>
           <a:off x="2032000" y="719666"/>
@@ -5770,6 +8750,386 @@
     <p:extLst>
       <p:ext uri="{BB962C8B-B14F-4D97-AF65-F5344CB8AC3E}">
         <p14:creationId xmlns:p14="http://schemas.microsoft.com/office/powerpoint/2010/main" val="2276048155"/>
+      </p:ext>
+    </p:extLst>
+  </p:cSld>
+  <p:clrMapOvr>
+    <a:masterClrMapping/>
+  </p:clrMapOvr>
+</p:sld>
+</file>
+
+<file path=ppt/slides/slide3.xml><?xml version="1.0" encoding="utf-8"?>
+<p:sld xmlns:a="http://schemas.openxmlformats.org/drawingml/2006/main" xmlns:r="http://schemas.openxmlformats.org/officeDocument/2006/relationships" xmlns:p="http://schemas.openxmlformats.org/presentationml/2006/main">
+  <p:cSld>
+    <p:spTree>
+      <p:nvGrpSpPr>
+        <p:cNvPr id="1" name=""/>
+        <p:cNvGrpSpPr/>
+        <p:nvPr/>
+      </p:nvGrpSpPr>
+      <p:grpSpPr>
+        <a:xfrm>
+          <a:off x="0" y="0"/>
+          <a:ext cx="0" cy="0"/>
+          <a:chOff x="0" y="0"/>
+          <a:chExt cx="0" cy="0"/>
+        </a:xfrm>
+      </p:grpSpPr>
+      <p:graphicFrame>
+        <p:nvGraphicFramePr>
+          <p:cNvPr id="6" name="グラフ 5">
+            <a:extLst>
+              <a:ext uri="{FF2B5EF4-FFF2-40B4-BE49-F238E27FC236}">
+                <a16:creationId xmlns:a16="http://schemas.microsoft.com/office/drawing/2014/main" id="{5E586A43-4B15-429F-8B35-AAF445B37C27}"/>
+              </a:ext>
+            </a:extLst>
+          </p:cNvPr>
+          <p:cNvGraphicFramePr/>
+          <p:nvPr/>
+        </p:nvGraphicFramePr>
+        <p:xfrm>
+          <a:off x="2032000" y="719666"/>
+          <a:ext cx="8128000" cy="5418667"/>
+        </p:xfrm>
+        <a:graphic>
+          <a:graphicData uri="http://schemas.openxmlformats.org/drawingml/2006/chart">
+            <c:chart xmlns:c="http://schemas.openxmlformats.org/drawingml/2006/chart" xmlns:r="http://schemas.openxmlformats.org/officeDocument/2006/relationships" r:id="rId2"/>
+          </a:graphicData>
+        </a:graphic>
+      </p:graphicFrame>
+    </p:spTree>
+    <p:extLst>
+      <p:ext uri="{BB962C8B-B14F-4D97-AF65-F5344CB8AC3E}">
+        <p14:creationId xmlns:p14="http://schemas.microsoft.com/office/powerpoint/2010/main" val="2690051246"/>
+      </p:ext>
+    </p:extLst>
+  </p:cSld>
+  <p:clrMapOvr>
+    <a:masterClrMapping/>
+  </p:clrMapOvr>
+</p:sld>
+</file>
+
+<file path=ppt/slides/slide4.xml><?xml version="1.0" encoding="utf-8"?>
+<p:sld xmlns:a="http://schemas.openxmlformats.org/drawingml/2006/main" xmlns:r="http://schemas.openxmlformats.org/officeDocument/2006/relationships" xmlns:p="http://schemas.openxmlformats.org/presentationml/2006/main">
+  <p:cSld>
+    <p:spTree>
+      <p:nvGrpSpPr>
+        <p:cNvPr id="1" name=""/>
+        <p:cNvGrpSpPr/>
+        <p:nvPr/>
+      </p:nvGrpSpPr>
+      <p:grpSpPr>
+        <a:xfrm>
+          <a:off x="0" y="0"/>
+          <a:ext cx="0" cy="0"/>
+          <a:chOff x="0" y="0"/>
+          <a:chExt cx="0" cy="0"/>
+        </a:xfrm>
+      </p:grpSpPr>
+      <p:sp>
+        <p:nvSpPr>
+          <p:cNvPr id="2" name="タイトル 1">
+            <a:extLst>
+              <a:ext uri="{FF2B5EF4-FFF2-40B4-BE49-F238E27FC236}">
+                <a16:creationId xmlns:a16="http://schemas.microsoft.com/office/drawing/2014/main" id="{023FC2BA-4C90-4075-8DE6-FD54112873A8}"/>
+              </a:ext>
+            </a:extLst>
+          </p:cNvPr>
+          <p:cNvSpPr>
+            <a:spLocks noGrp="1"/>
+          </p:cNvSpPr>
+          <p:nvPr>
+            <p:ph type="title"/>
+          </p:nvPr>
+        </p:nvSpPr>
+        <p:spPr/>
+        <p:txBody>
+          <a:bodyPr/>
+          <a:lstStyle/>
+          <a:p>
+            <a:r>
+              <a:rPr kumimoji="1" lang="ja-JP" altLang="en-US" dirty="0"/>
+              <a:t>ひすとぐらむ</a:t>
+            </a:r>
+          </a:p>
+        </p:txBody>
+      </p:sp>
+      <mc:AlternateContent xmlns:mc="http://schemas.openxmlformats.org/markup-compatibility/2006">
+        <mc:Choice xmlns:cx1="http://schemas.microsoft.com/office/drawing/2015/9/8/chartex" Requires="cx1">
+          <p:graphicFrame>
+            <p:nvGraphicFramePr>
+              <p:cNvPr id="6" name="コンテンツ プレースホルダー 5">
+                <a:extLst>
+                  <a:ext uri="{FF2B5EF4-FFF2-40B4-BE49-F238E27FC236}">
+                    <a16:creationId xmlns:a16="http://schemas.microsoft.com/office/drawing/2014/main" id="{C0C06A81-16AA-4172-869F-DB5D224296CF}"/>
+                  </a:ext>
+                </a:extLst>
+              </p:cNvPr>
+              <p:cNvGraphicFramePr>
+                <a:graphicFrameLocks noGrp="1"/>
+              </p:cNvGraphicFramePr>
+              <p:nvPr>
+                <p:ph idx="1"/>
+                <p:extLst>
+                  <p:ext uri="{D42A27DB-BD31-4B8C-83A1-F6EECF244321}">
+                    <p14:modId xmlns:p14="http://schemas.microsoft.com/office/powerpoint/2010/main" val="2087717702"/>
+                  </p:ext>
+                </p:extLst>
+              </p:nvPr>
+            </p:nvGraphicFramePr>
+            <p:xfrm>
+              <a:off x="838200" y="1825625"/>
+              <a:ext cx="10515600" cy="4351338"/>
+            </p:xfrm>
+            <a:graphic>
+              <a:graphicData uri="http://schemas.microsoft.com/office/drawing/2014/chartex">
+                <cx:chart xmlns:cx="http://schemas.microsoft.com/office/drawing/2014/chartex" xmlns:r="http://schemas.openxmlformats.org/officeDocument/2006/relationships" r:id="rId2"/>
+              </a:graphicData>
+            </a:graphic>
+          </p:graphicFrame>
+        </mc:Choice>
+        <mc:Fallback>
+          <p:pic>
+            <p:nvPicPr>
+              <p:cNvPr id="6" name="コンテンツ プレースホルダー 5">
+                <a:extLst>
+                  <a:ext uri="{FF2B5EF4-FFF2-40B4-BE49-F238E27FC236}">
+                    <a16:creationId xmlns:a16="http://schemas.microsoft.com/office/drawing/2014/main" id="{C0C06A81-16AA-4172-869F-DB5D224296CF}"/>
+                  </a:ext>
+                </a:extLst>
+              </p:cNvPr>
+              <p:cNvPicPr>
+                <a:picLocks noGrp="1" noRot="1" noChangeAspect="1" noMove="1" noResize="1" noEditPoints="1" noAdjustHandles="1" noChangeArrowheads="1" noChangeShapeType="1"/>
+              </p:cNvPicPr>
+              <p:nvPr/>
+            </p:nvPicPr>
+            <p:blipFill>
+              <a:blip r:embed="rId3"/>
+              <a:stretch>
+                <a:fillRect/>
+              </a:stretch>
+            </p:blipFill>
+            <p:spPr>
+              <a:xfrm>
+                <a:off x="838200" y="1825625"/>
+                <a:ext cx="10515600" cy="4351338"/>
+              </a:xfrm>
+              <a:prstGeom prst="rect">
+                <a:avLst/>
+              </a:prstGeom>
+            </p:spPr>
+          </p:pic>
+        </mc:Fallback>
+      </mc:AlternateContent>
+    </p:spTree>
+    <p:extLst>
+      <p:ext uri="{BB962C8B-B14F-4D97-AF65-F5344CB8AC3E}">
+        <p14:creationId xmlns:p14="http://schemas.microsoft.com/office/powerpoint/2010/main" val="3143129947"/>
+      </p:ext>
+    </p:extLst>
+  </p:cSld>
+  <p:clrMapOvr>
+    <a:masterClrMapping/>
+  </p:clrMapOvr>
+</p:sld>
+</file>
+
+<file path=ppt/slides/slide5.xml><?xml version="1.0" encoding="utf-8"?>
+<p:sld xmlns:a="http://schemas.openxmlformats.org/drawingml/2006/main" xmlns:r="http://schemas.openxmlformats.org/officeDocument/2006/relationships" xmlns:p="http://schemas.openxmlformats.org/presentationml/2006/main">
+  <p:cSld>
+    <p:spTree>
+      <p:nvGrpSpPr>
+        <p:cNvPr id="1" name=""/>
+        <p:cNvGrpSpPr/>
+        <p:nvPr/>
+      </p:nvGrpSpPr>
+      <p:grpSpPr>
+        <a:xfrm>
+          <a:off x="0" y="0"/>
+          <a:ext cx="0" cy="0"/>
+          <a:chOff x="0" y="0"/>
+          <a:chExt cx="0" cy="0"/>
+        </a:xfrm>
+      </p:grpSpPr>
+      <p:sp>
+        <p:nvSpPr>
+          <p:cNvPr id="2" name="タイトル 1">
+            <a:extLst>
+              <a:ext uri="{FF2B5EF4-FFF2-40B4-BE49-F238E27FC236}">
+                <a16:creationId xmlns:a16="http://schemas.microsoft.com/office/drawing/2014/main" id="{9632F3AF-1118-4189-8E6A-5BF047873068}"/>
+              </a:ext>
+            </a:extLst>
+          </p:cNvPr>
+          <p:cNvSpPr>
+            <a:spLocks noGrp="1"/>
+          </p:cNvSpPr>
+          <p:nvPr>
+            <p:ph type="title"/>
+          </p:nvPr>
+        </p:nvSpPr>
+        <p:spPr/>
+        <p:txBody>
+          <a:bodyPr/>
+          <a:lstStyle/>
+          <a:p>
+            <a:endParaRPr kumimoji="1" lang="ja-JP" altLang="en-US"/>
+          </a:p>
+        </p:txBody>
+      </p:sp>
+      <p:graphicFrame>
+        <p:nvGraphicFramePr>
+          <p:cNvPr id="6" name="コンテンツ プレースホルダー 5">
+            <a:extLst>
+              <a:ext uri="{FF2B5EF4-FFF2-40B4-BE49-F238E27FC236}">
+                <a16:creationId xmlns:a16="http://schemas.microsoft.com/office/drawing/2014/main" id="{D69FF1EC-4248-4C21-B586-13D591FEDE78}"/>
+              </a:ext>
+            </a:extLst>
+          </p:cNvPr>
+          <p:cNvGraphicFramePr>
+            <a:graphicFrameLocks noGrp="1"/>
+          </p:cNvGraphicFramePr>
+          <p:nvPr>
+            <p:ph idx="1"/>
+            <p:extLst>
+              <p:ext uri="{D42A27DB-BD31-4B8C-83A1-F6EECF244321}">
+                <p14:modId xmlns:p14="http://schemas.microsoft.com/office/powerpoint/2010/main" val="506835540"/>
+              </p:ext>
+            </p:extLst>
+          </p:nvPr>
+        </p:nvGraphicFramePr>
+        <p:xfrm>
+          <a:off x="838200" y="1825625"/>
+          <a:ext cx="10515600" cy="4351338"/>
+        </p:xfrm>
+        <a:graphic>
+          <a:graphicData uri="http://schemas.openxmlformats.org/drawingml/2006/chart">
+            <c:chart xmlns:c="http://schemas.openxmlformats.org/drawingml/2006/chart" xmlns:r="http://schemas.openxmlformats.org/officeDocument/2006/relationships" r:id="rId2"/>
+          </a:graphicData>
+        </a:graphic>
+      </p:graphicFrame>
+    </p:spTree>
+    <p:extLst>
+      <p:ext uri="{BB962C8B-B14F-4D97-AF65-F5344CB8AC3E}">
+        <p14:creationId xmlns:p14="http://schemas.microsoft.com/office/powerpoint/2010/main" val="3409086054"/>
+      </p:ext>
+    </p:extLst>
+  </p:cSld>
+  <p:clrMapOvr>
+    <a:masterClrMapping/>
+  </p:clrMapOvr>
+</p:sld>
+</file>
+
+<file path=ppt/slides/slide6.xml><?xml version="1.0" encoding="utf-8"?>
+<p:sld xmlns:a="http://schemas.openxmlformats.org/drawingml/2006/main" xmlns:r="http://schemas.openxmlformats.org/officeDocument/2006/relationships" xmlns:p="http://schemas.openxmlformats.org/presentationml/2006/main">
+  <p:cSld>
+    <p:spTree>
+      <p:nvGrpSpPr>
+        <p:cNvPr id="1" name=""/>
+        <p:cNvGrpSpPr/>
+        <p:nvPr/>
+      </p:nvGrpSpPr>
+      <p:grpSpPr>
+        <a:xfrm>
+          <a:off x="0" y="0"/>
+          <a:ext cx="0" cy="0"/>
+          <a:chOff x="0" y="0"/>
+          <a:chExt cx="0" cy="0"/>
+        </a:xfrm>
+      </p:grpSpPr>
+      <p:sp>
+        <p:nvSpPr>
+          <p:cNvPr id="2" name="タイトル 1">
+            <a:extLst>
+              <a:ext uri="{FF2B5EF4-FFF2-40B4-BE49-F238E27FC236}">
+                <a16:creationId xmlns:a16="http://schemas.microsoft.com/office/drawing/2014/main" id="{403638C2-B95B-4A67-B69F-75F95F09566A}"/>
+              </a:ext>
+            </a:extLst>
+          </p:cNvPr>
+          <p:cNvSpPr>
+            <a:spLocks noGrp="1"/>
+          </p:cNvSpPr>
+          <p:nvPr>
+            <p:ph type="title"/>
+          </p:nvPr>
+        </p:nvSpPr>
+        <p:spPr/>
+        <p:txBody>
+          <a:bodyPr/>
+          <a:lstStyle/>
+          <a:p>
+            <a:endParaRPr kumimoji="1" lang="ja-JP" altLang="en-US"/>
+          </a:p>
+        </p:txBody>
+      </p:sp>
+      <mc:AlternateContent xmlns:mc="http://schemas.openxmlformats.org/markup-compatibility/2006" xmlns:cx2="http://schemas.microsoft.com/office/drawing/2015/10/21/chartex">
+        <mc:Choice Requires="cx2">
+          <p:graphicFrame>
+            <p:nvGraphicFramePr>
+              <p:cNvPr id="6" name="コンテンツ プレースホルダー 5">
+                <a:extLst>
+                  <a:ext uri="{FF2B5EF4-FFF2-40B4-BE49-F238E27FC236}">
+                    <a16:creationId xmlns:a16="http://schemas.microsoft.com/office/drawing/2014/main" id="{7EBC41BE-5104-4FF3-8D61-120AE70770A0}"/>
+                  </a:ext>
+                </a:extLst>
+              </p:cNvPr>
+              <p:cNvGraphicFramePr>
+                <a:graphicFrameLocks noGrp="1"/>
+              </p:cNvGraphicFramePr>
+              <p:nvPr>
+                <p:ph idx="1"/>
+              </p:nvPr>
+            </p:nvGraphicFramePr>
+            <p:xfrm>
+              <a:off x="838200" y="1825625"/>
+              <a:ext cx="10515600" cy="4351338"/>
+            </p:xfrm>
+            <a:graphic>
+              <a:graphicData uri="http://schemas.microsoft.com/office/drawing/2014/chartex">
+                <cx:chart xmlns:cx="http://schemas.microsoft.com/office/drawing/2014/chartex" xmlns:r="http://schemas.openxmlformats.org/officeDocument/2006/relationships" r:id="rId2"/>
+              </a:graphicData>
+            </a:graphic>
+          </p:graphicFrame>
+        </mc:Choice>
+        <mc:Fallback xmlns="">
+          <p:pic>
+            <p:nvPicPr>
+              <p:cNvPr id="6" name="コンテンツ プレースホルダー 5">
+                <a:extLst>
+                  <a:ext uri="{FF2B5EF4-FFF2-40B4-BE49-F238E27FC236}">
+                    <a16:creationId xmlns:a16="http://schemas.microsoft.com/office/drawing/2014/main" id="{7EBC41BE-5104-4FF3-8D61-120AE70770A0}"/>
+                  </a:ext>
+                </a:extLst>
+              </p:cNvPr>
+              <p:cNvPicPr>
+                <a:picLocks noGrp="1" noRot="1" noChangeAspect="1" noMove="1" noResize="1" noEditPoints="1" noAdjustHandles="1" noChangeArrowheads="1" noChangeShapeType="1"/>
+              </p:cNvPicPr>
+              <p:nvPr/>
+            </p:nvPicPr>
+            <p:blipFill>
+              <a:blip r:embed="rId3"/>
+              <a:stretch>
+                <a:fillRect/>
+              </a:stretch>
+            </p:blipFill>
+            <p:spPr>
+              <a:xfrm>
+                <a:off x="838200" y="1825625"/>
+                <a:ext cx="10515600" cy="4351338"/>
+              </a:xfrm>
+              <a:prstGeom prst="rect">
+                <a:avLst/>
+              </a:prstGeom>
+            </p:spPr>
+          </p:pic>
+        </mc:Fallback>
+      </mc:AlternateContent>
+    </p:spTree>
+    <p:extLst>
+      <p:ext uri="{BB962C8B-B14F-4D97-AF65-F5344CB8AC3E}">
+        <p14:creationId xmlns:p14="http://schemas.microsoft.com/office/powerpoint/2010/main" val="2841713456"/>
       </p:ext>
     </p:extLst>
   </p:cSld>

</xml_diff>